<commit_message>
forgot to finish off the HubPipeline
</commit_message>
<xml_diff>
--- a/SignalR.pptx
+++ b/SignalR.pptx
@@ -37,7 +37,9 @@
     <p:sldId id="297" r:id="rId31"/>
     <p:sldId id="296" r:id="rId32"/>
     <p:sldId id="298" r:id="rId33"/>
-    <p:sldId id="299" r:id="rId34"/>
+    <p:sldId id="300" r:id="rId34"/>
+    <p:sldId id="301" r:id="rId35"/>
+    <p:sldId id="299" r:id="rId36"/>
   </p:sldIdLst>
   <p:sldSz cx="12192000" cy="6858000"/>
   <p:notesSz cx="6858000" cy="9144000"/>
@@ -25433,6 +25435,2572 @@
                 <a:latin typeface="Segoe UI" panose="020B0502040204020203" pitchFamily="34" charset="0"/>
                 <a:cs typeface="Segoe UI" panose="020B0502040204020203" pitchFamily="34" charset="0"/>
               </a:rPr>
+              <a:t>Calling methods from outside the Hub class</a:t>
+            </a:r>
+            <a:endParaRPr lang="en-ZA" cap="none" dirty="0">
+              <a:latin typeface="Segoe UI" panose="020B0502040204020203" pitchFamily="34" charset="0"/>
+              <a:cs typeface="Segoe UI" panose="020B0502040204020203" pitchFamily="34" charset="0"/>
+            </a:endParaRPr>
+          </a:p>
+        </p:txBody>
+      </p:sp>
+      <p:sp>
+        <p:nvSpPr>
+          <p:cNvPr id="8" name="Text Placeholder 7">
+            <a:extLst>
+              <a:ext uri="{FF2B5EF4-FFF2-40B4-BE49-F238E27FC236}">
+                <a16:creationId xmlns:a16="http://schemas.microsoft.com/office/drawing/2014/main" id="{A0EC8C3A-CB99-4164-95BB-D449B771D816}"/>
+              </a:ext>
+            </a:extLst>
+          </p:cNvPr>
+          <p:cNvSpPr>
+            <a:spLocks noGrp="1"/>
+          </p:cNvSpPr>
+          <p:nvPr>
+            <p:ph type="body" idx="1"/>
+          </p:nvPr>
+        </p:nvSpPr>
+        <p:spPr>
+          <a:xfrm>
+            <a:off x="684213" y="1451295"/>
+            <a:ext cx="9961416" cy="4543105"/>
+          </a:xfrm>
+          <a:prstGeom prst="round2DiagRect">
+            <a:avLst>
+              <a:gd name="adj1" fmla="val 5772"/>
+              <a:gd name="adj2" fmla="val 0"/>
+            </a:avLst>
+          </a:prstGeom>
+          <a:solidFill>
+            <a:schemeClr val="accent1">
+              <a:alpha val="50000"/>
+            </a:schemeClr>
+          </a:solidFill>
+          <a:ln>
+            <a:noFill/>
+          </a:ln>
+        </p:spPr>
+        <p:style>
+          <a:lnRef idx="0">
+            <a:scrgbClr r="0" g="0" b="0"/>
+          </a:lnRef>
+          <a:fillRef idx="0">
+            <a:scrgbClr r="0" g="0" b="0"/>
+          </a:fillRef>
+          <a:effectRef idx="0">
+            <a:scrgbClr r="0" g="0" b="0"/>
+          </a:effectRef>
+          <a:fontRef idx="minor">
+            <a:schemeClr val="lt1"/>
+          </a:fontRef>
+        </p:style>
+        <p:txBody>
+          <a:bodyPr anchor="ctr">
+            <a:normAutofit/>
+          </a:bodyPr>
+          <a:lstStyle/>
+          <a:p>
+            <a:pPr marL="285750" indent="-285750">
+              <a:buFont typeface="Arial" panose="020B0604020202020204" pitchFamily="34" charset="0"/>
+              <a:buChar char="•"/>
+            </a:pPr>
+            <a:r>
+              <a:rPr lang="en-US" dirty="0">
+                <a:solidFill>
+                  <a:schemeClr val="tx2">
+                    <a:lumMod val="20000"/>
+                    <a:lumOff val="80000"/>
+                  </a:schemeClr>
+                </a:solidFill>
+                <a:latin typeface="Segoe UI Light" panose="020B0502040204020203" pitchFamily="34" charset="0"/>
+                <a:cs typeface="Segoe UI Light" panose="020B0502040204020203" pitchFamily="34" charset="0"/>
+              </a:rPr>
+              <a:t>Because you are calling client methods from within your own server-code, you do not have access to all the client properties that are dependent on the </a:t>
+            </a:r>
+            <a:r>
+              <a:rPr lang="en-US" b="1" dirty="0">
+                <a:ln w="9525">
+                  <a:solidFill>
+                    <a:schemeClr val="bg1"/>
+                  </a:solidFill>
+                  <a:prstDash val="solid"/>
+                </a:ln>
+                <a:solidFill>
+                  <a:schemeClr val="tx1"/>
+                </a:solidFill>
+                <a:effectLst>
+                  <a:outerShdw blurRad="12700" dist="38100" dir="2700000" algn="tl" rotWithShape="0">
+                    <a:schemeClr val="bg1">
+                      <a:lumMod val="50000"/>
+                    </a:schemeClr>
+                  </a:outerShdw>
+                </a:effectLst>
+                <a:latin typeface="Consolas" panose="020B0609020204030204" pitchFamily="49" charset="0"/>
+                <a:cs typeface="Segoe UI Light" panose="020B0502040204020203" pitchFamily="34" charset="0"/>
+              </a:rPr>
+              <a:t>Connection ID</a:t>
+            </a:r>
+            <a:r>
+              <a:rPr lang="en-US" dirty="0">
+                <a:solidFill>
+                  <a:schemeClr val="tx2">
+                    <a:lumMod val="20000"/>
+                    <a:lumOff val="80000"/>
+                  </a:schemeClr>
+                </a:solidFill>
+                <a:latin typeface="Segoe UI Light" panose="020B0502040204020203" pitchFamily="34" charset="0"/>
+                <a:cs typeface="Segoe UI Light" panose="020B0502040204020203" pitchFamily="34" charset="0"/>
+              </a:rPr>
+              <a:t>. The following options are available:</a:t>
+            </a:r>
+          </a:p>
+          <a:p>
+            <a:pPr marL="742950" lvl="1" indent="-285750">
+              <a:buFont typeface="Arial" panose="020B0604020202020204" pitchFamily="34" charset="0"/>
+              <a:buChar char="•"/>
+            </a:pPr>
+            <a:r>
+              <a:rPr lang="en-US" sz="1400" b="1" dirty="0">
+                <a:ln w="9525">
+                  <a:solidFill>
+                    <a:schemeClr val="bg1"/>
+                  </a:solidFill>
+                  <a:prstDash val="solid"/>
+                </a:ln>
+                <a:solidFill>
+                  <a:schemeClr val="tx1"/>
+                </a:solidFill>
+                <a:effectLst>
+                  <a:outerShdw blurRad="12700" dist="38100" dir="2700000" algn="tl" rotWithShape="0">
+                    <a:schemeClr val="bg1">
+                      <a:lumMod val="50000"/>
+                    </a:schemeClr>
+                  </a:outerShdw>
+                </a:effectLst>
+                <a:latin typeface="Consolas" panose="020B0609020204030204" pitchFamily="49" charset="0"/>
+                <a:cs typeface="Segoe UI Light" panose="020B0502040204020203" pitchFamily="34" charset="0"/>
+              </a:rPr>
+              <a:t>context.Clients.All.SendMessage(message);</a:t>
+            </a:r>
+          </a:p>
+          <a:p>
+            <a:pPr marL="742950" lvl="1" indent="-285750">
+              <a:buFont typeface="Arial" panose="020B0604020202020204" pitchFamily="34" charset="0"/>
+              <a:buChar char="•"/>
+            </a:pPr>
+            <a:r>
+              <a:rPr lang="en-US" sz="1400" b="1" dirty="0">
+                <a:ln w="9525">
+                  <a:solidFill>
+                    <a:schemeClr val="bg1"/>
+                  </a:solidFill>
+                  <a:prstDash val="solid"/>
+                </a:ln>
+                <a:solidFill>
+                  <a:schemeClr val="tx1"/>
+                </a:solidFill>
+                <a:effectLst>
+                  <a:outerShdw blurRad="12700" dist="38100" dir="2700000" algn="tl" rotWithShape="0">
+                    <a:schemeClr val="bg1">
+                      <a:lumMod val="50000"/>
+                    </a:schemeClr>
+                  </a:outerShdw>
+                </a:effectLst>
+                <a:latin typeface="Consolas" panose="020B0609020204030204" pitchFamily="49" charset="0"/>
+                <a:cs typeface="Segoe UI Light" panose="020B0502040204020203" pitchFamily="34" charset="0"/>
+              </a:rPr>
+              <a:t>context.Clients.Client(connectionID).SendMessage(message);</a:t>
+            </a:r>
+          </a:p>
+          <a:p>
+            <a:pPr marL="742950" lvl="1" indent="-285750">
+              <a:buFont typeface="Arial" panose="020B0604020202020204" pitchFamily="34" charset="0"/>
+              <a:buChar char="•"/>
+            </a:pPr>
+            <a:r>
+              <a:rPr lang="en-US" sz="1400" b="1" dirty="0">
+                <a:ln w="9525">
+                  <a:solidFill>
+                    <a:schemeClr val="bg1"/>
+                  </a:solidFill>
+                  <a:prstDash val="solid"/>
+                </a:ln>
+                <a:solidFill>
+                  <a:schemeClr val="tx1"/>
+                </a:solidFill>
+                <a:effectLst>
+                  <a:outerShdw blurRad="12700" dist="38100" dir="2700000" algn="tl" rotWithShape="0">
+                    <a:schemeClr val="bg1">
+                      <a:lumMod val="50000"/>
+                    </a:schemeClr>
+                  </a:outerShdw>
+                </a:effectLst>
+                <a:latin typeface="Consolas" panose="020B0609020204030204" pitchFamily="49" charset="0"/>
+                <a:cs typeface="Segoe UI Light" panose="020B0502040204020203" pitchFamily="34" charset="0"/>
+              </a:rPr>
+              <a:t>context.Clients.AllExcept(connectionId1, connectionId2).SendMessage(message);</a:t>
+            </a:r>
+          </a:p>
+          <a:p>
+            <a:pPr marL="742950" lvl="1" indent="-285750">
+              <a:buFont typeface="Arial" panose="020B0604020202020204" pitchFamily="34" charset="0"/>
+              <a:buChar char="•"/>
+            </a:pPr>
+            <a:r>
+              <a:rPr lang="en-US" sz="1400" b="1" dirty="0">
+                <a:ln w="9525">
+                  <a:solidFill>
+                    <a:schemeClr val="bg1"/>
+                  </a:solidFill>
+                  <a:prstDash val="solid"/>
+                </a:ln>
+                <a:solidFill>
+                  <a:schemeClr val="tx1"/>
+                </a:solidFill>
+                <a:effectLst>
+                  <a:outerShdw blurRad="12700" dist="38100" dir="2700000" algn="tl" rotWithShape="0">
+                    <a:schemeClr val="bg1">
+                      <a:lumMod val="50000"/>
+                    </a:schemeClr>
+                  </a:outerShdw>
+                </a:effectLst>
+                <a:latin typeface="Consolas" panose="020B0609020204030204" pitchFamily="49" charset="0"/>
+                <a:cs typeface="Segoe UI Light" panose="020B0502040204020203" pitchFamily="34" charset="0"/>
+              </a:rPr>
+              <a:t>context.Clients.Group(groupName).SendMessage(message);</a:t>
+            </a:r>
+          </a:p>
+          <a:p>
+            <a:pPr marL="742950" lvl="1" indent="-285750">
+              <a:buFont typeface="Arial" panose="020B0604020202020204" pitchFamily="34" charset="0"/>
+              <a:buChar char="•"/>
+            </a:pPr>
+            <a:r>
+              <a:rPr lang="en-US" sz="1400" b="1" dirty="0">
+                <a:ln w="9525">
+                  <a:solidFill>
+                    <a:schemeClr val="bg1"/>
+                  </a:solidFill>
+                  <a:prstDash val="solid"/>
+                </a:ln>
+                <a:solidFill>
+                  <a:schemeClr val="tx1"/>
+                </a:solidFill>
+                <a:effectLst>
+                  <a:outerShdw blurRad="12700" dist="38100" dir="2700000" algn="tl" rotWithShape="0">
+                    <a:schemeClr val="bg1">
+                      <a:lumMod val="50000"/>
+                    </a:schemeClr>
+                  </a:outerShdw>
+                </a:effectLst>
+                <a:latin typeface="Consolas" panose="020B0609020204030204" pitchFamily="49" charset="0"/>
+                <a:cs typeface="Segoe UI Light" panose="020B0502040204020203" pitchFamily="34" charset="0"/>
+              </a:rPr>
+              <a:t>Clients.Group(groupName, connectionId1, connectionId2).SendMessage(message);</a:t>
+            </a:r>
+          </a:p>
+        </p:txBody>
+      </p:sp>
+    </p:spTree>
+    <p:extLst>
+      <p:ext uri="{BB962C8B-B14F-4D97-AF65-F5344CB8AC3E}">
+        <p14:creationId xmlns:p14="http://schemas.microsoft.com/office/powerpoint/2010/main" val="783949340"/>
+      </p:ext>
+    </p:extLst>
+  </p:cSld>
+  <p:clrMapOvr>
+    <a:masterClrMapping/>
+  </p:clrMapOvr>
+</p:sld>
+</file>
+
+<file path=ppt/slides/slide34.xml><?xml version="1.0" encoding="utf-8"?>
+<p:sld xmlns:a="http://schemas.openxmlformats.org/drawingml/2006/main" xmlns:r="http://schemas.openxmlformats.org/officeDocument/2006/relationships" xmlns:p="http://schemas.openxmlformats.org/presentationml/2006/main">
+  <p:cSld>
+    <p:spTree>
+      <p:nvGrpSpPr>
+        <p:cNvPr id="1" name=""/>
+        <p:cNvGrpSpPr/>
+        <p:nvPr/>
+      </p:nvGrpSpPr>
+      <p:grpSpPr>
+        <a:xfrm>
+          <a:off x="0" y="0"/>
+          <a:ext cx="0" cy="0"/>
+          <a:chOff x="0" y="0"/>
+          <a:chExt cx="0" cy="0"/>
+        </a:xfrm>
+      </p:grpSpPr>
+      <p:sp>
+        <p:nvSpPr>
+          <p:cNvPr id="7" name="Title 6">
+            <a:extLst>
+              <a:ext uri="{FF2B5EF4-FFF2-40B4-BE49-F238E27FC236}">
+                <a16:creationId xmlns:a16="http://schemas.microsoft.com/office/drawing/2014/main" id="{995CDE5A-4025-488F-9F23-4B1873D72739}"/>
+              </a:ext>
+            </a:extLst>
+          </p:cNvPr>
+          <p:cNvSpPr>
+            <a:spLocks noGrp="1"/>
+          </p:cNvSpPr>
+          <p:nvPr>
+            <p:ph type="title"/>
+          </p:nvPr>
+        </p:nvSpPr>
+        <p:spPr>
+          <a:xfrm>
+            <a:off x="684211" y="755008"/>
+            <a:ext cx="10823576" cy="696287"/>
+          </a:xfrm>
+        </p:spPr>
+        <p:txBody>
+          <a:bodyPr anchor="t">
+            <a:normAutofit/>
+          </a:bodyPr>
+          <a:lstStyle/>
+          <a:p>
+            <a:r>
+              <a:rPr lang="en-US" cap="none" dirty="0">
+                <a:latin typeface="Segoe UI" panose="020B0502040204020203" pitchFamily="34" charset="0"/>
+                <a:cs typeface="Segoe UI" panose="020B0502040204020203" pitchFamily="34" charset="0"/>
+              </a:rPr>
+              <a:t>Customizing the Hubs pipeline</a:t>
+            </a:r>
+            <a:endParaRPr lang="en-ZA" cap="none" dirty="0">
+              <a:latin typeface="Segoe UI" panose="020B0502040204020203" pitchFamily="34" charset="0"/>
+              <a:cs typeface="Segoe UI" panose="020B0502040204020203" pitchFamily="34" charset="0"/>
+            </a:endParaRPr>
+          </a:p>
+        </p:txBody>
+      </p:sp>
+      <p:sp>
+        <p:nvSpPr>
+          <p:cNvPr id="8" name="Text Placeholder 7">
+            <a:extLst>
+              <a:ext uri="{FF2B5EF4-FFF2-40B4-BE49-F238E27FC236}">
+                <a16:creationId xmlns:a16="http://schemas.microsoft.com/office/drawing/2014/main" id="{A0EC8C3A-CB99-4164-95BB-D449B771D816}"/>
+              </a:ext>
+            </a:extLst>
+          </p:cNvPr>
+          <p:cNvSpPr>
+            <a:spLocks noGrp="1"/>
+          </p:cNvSpPr>
+          <p:nvPr>
+            <p:ph type="body" idx="1"/>
+          </p:nvPr>
+        </p:nvSpPr>
+        <p:spPr>
+          <a:xfrm>
+            <a:off x="684213" y="1451295"/>
+            <a:ext cx="9961416" cy="4543105"/>
+          </a:xfrm>
+          <a:prstGeom prst="round2DiagRect">
+            <a:avLst>
+              <a:gd name="adj1" fmla="val 5772"/>
+              <a:gd name="adj2" fmla="val 0"/>
+            </a:avLst>
+          </a:prstGeom>
+          <a:solidFill>
+            <a:schemeClr val="accent1">
+              <a:alpha val="50000"/>
+            </a:schemeClr>
+          </a:solidFill>
+          <a:ln>
+            <a:noFill/>
+          </a:ln>
+        </p:spPr>
+        <p:style>
+          <a:lnRef idx="0">
+            <a:scrgbClr r="0" g="0" b="0"/>
+          </a:lnRef>
+          <a:fillRef idx="0">
+            <a:scrgbClr r="0" g="0" b="0"/>
+          </a:fillRef>
+          <a:effectRef idx="0">
+            <a:scrgbClr r="0" g="0" b="0"/>
+          </a:effectRef>
+          <a:fontRef idx="minor">
+            <a:schemeClr val="lt1"/>
+          </a:fontRef>
+        </p:style>
+        <p:txBody>
+          <a:bodyPr anchor="ctr">
+            <a:normAutofit/>
+          </a:bodyPr>
+          <a:lstStyle/>
+          <a:p>
+            <a:pPr marL="285750" indent="-285750">
+              <a:buFont typeface="Arial" panose="020B0604020202020204" pitchFamily="34" charset="0"/>
+              <a:buChar char="•"/>
+            </a:pPr>
+            <a:r>
+              <a:rPr lang="en-US" dirty="0">
+                <a:solidFill>
+                  <a:schemeClr val="tx2">
+                    <a:lumMod val="20000"/>
+                    <a:lumOff val="80000"/>
+                  </a:schemeClr>
+                </a:solidFill>
+                <a:latin typeface="Segoe UI Light" panose="020B0502040204020203" pitchFamily="34" charset="0"/>
+                <a:cs typeface="Segoe UI Light" panose="020B0502040204020203" pitchFamily="34" charset="0"/>
+              </a:rPr>
+              <a:t>SignalR enables you to inject your own code into the Hub pipeline. The following example shows a custom Hub pipeline module that logs each incoming method call received from the client and outgoing method call invoked on the client:</a:t>
+            </a:r>
+          </a:p>
+          <a:p>
+            <a:pPr marL="285750" indent="-285750">
+              <a:buFont typeface="Arial" panose="020B0604020202020204" pitchFamily="34" charset="0"/>
+              <a:buChar char="•"/>
+            </a:pPr>
+            <a:endParaRPr lang="en-US" dirty="0">
+              <a:solidFill>
+                <a:schemeClr val="tx2">
+                  <a:lumMod val="20000"/>
+                  <a:lumOff val="80000"/>
+                </a:schemeClr>
+              </a:solidFill>
+              <a:latin typeface="Segoe UI Light" panose="020B0502040204020203" pitchFamily="34" charset="0"/>
+              <a:cs typeface="Segoe UI Light" panose="020B0502040204020203" pitchFamily="34" charset="0"/>
+            </a:endParaRPr>
+          </a:p>
+          <a:p>
+            <a:pPr marL="285750" indent="-285750">
+              <a:buFont typeface="Arial" panose="020B0604020202020204" pitchFamily="34" charset="0"/>
+              <a:buChar char="•"/>
+            </a:pPr>
+            <a:endParaRPr lang="en-US" dirty="0">
+              <a:solidFill>
+                <a:schemeClr val="tx2">
+                  <a:lumMod val="20000"/>
+                  <a:lumOff val="80000"/>
+                </a:schemeClr>
+              </a:solidFill>
+              <a:latin typeface="Segoe UI Light" panose="020B0502040204020203" pitchFamily="34" charset="0"/>
+              <a:cs typeface="Segoe UI Light" panose="020B0502040204020203" pitchFamily="34" charset="0"/>
+            </a:endParaRPr>
+          </a:p>
+          <a:p>
+            <a:pPr marL="285750" indent="-285750">
+              <a:buFont typeface="Arial" panose="020B0604020202020204" pitchFamily="34" charset="0"/>
+              <a:buChar char="•"/>
+            </a:pPr>
+            <a:endParaRPr lang="en-US" dirty="0">
+              <a:solidFill>
+                <a:schemeClr val="tx2">
+                  <a:lumMod val="20000"/>
+                  <a:lumOff val="80000"/>
+                </a:schemeClr>
+              </a:solidFill>
+              <a:latin typeface="Segoe UI Light" panose="020B0502040204020203" pitchFamily="34" charset="0"/>
+              <a:cs typeface="Segoe UI Light" panose="020B0502040204020203" pitchFamily="34" charset="0"/>
+            </a:endParaRPr>
+          </a:p>
+          <a:p>
+            <a:pPr marL="285750" indent="-285750">
+              <a:buFont typeface="Arial" panose="020B0604020202020204" pitchFamily="34" charset="0"/>
+              <a:buChar char="•"/>
+            </a:pPr>
+            <a:endParaRPr lang="en-US" dirty="0">
+              <a:solidFill>
+                <a:schemeClr val="tx2">
+                  <a:lumMod val="20000"/>
+                  <a:lumOff val="80000"/>
+                </a:schemeClr>
+              </a:solidFill>
+              <a:latin typeface="Segoe UI Light" panose="020B0502040204020203" pitchFamily="34" charset="0"/>
+              <a:cs typeface="Segoe UI Light" panose="020B0502040204020203" pitchFamily="34" charset="0"/>
+            </a:endParaRPr>
+          </a:p>
+          <a:p>
+            <a:endParaRPr lang="en-US" dirty="0">
+              <a:solidFill>
+                <a:schemeClr val="tx2">
+                  <a:lumMod val="20000"/>
+                  <a:lumOff val="80000"/>
+                </a:schemeClr>
+              </a:solidFill>
+              <a:latin typeface="Segoe UI Light" panose="020B0502040204020203" pitchFamily="34" charset="0"/>
+              <a:cs typeface="Segoe UI Light" panose="020B0502040204020203" pitchFamily="34" charset="0"/>
+            </a:endParaRPr>
+          </a:p>
+          <a:p>
+            <a:pPr marL="285750" indent="-285750">
+              <a:buFont typeface="Arial" panose="020B0604020202020204" pitchFamily="34" charset="0"/>
+              <a:buChar char="•"/>
+            </a:pPr>
+            <a:r>
+              <a:rPr lang="en-US" dirty="0">
+                <a:solidFill>
+                  <a:schemeClr val="tx2">
+                    <a:lumMod val="20000"/>
+                    <a:lumOff val="80000"/>
+                  </a:schemeClr>
+                </a:solidFill>
+                <a:latin typeface="Segoe UI Light" panose="020B0502040204020203" pitchFamily="34" charset="0"/>
+                <a:cs typeface="Segoe UI Light" panose="020B0502040204020203" pitchFamily="34" charset="0"/>
+              </a:rPr>
+              <a:t>Add the module to the Hub Pipeline:</a:t>
+            </a:r>
+          </a:p>
+          <a:p>
+            <a:pPr marL="285750" indent="-285750">
+              <a:buFont typeface="Arial" panose="020B0604020202020204" pitchFamily="34" charset="0"/>
+              <a:buChar char="•"/>
+            </a:pPr>
+            <a:endParaRPr lang="en-US" dirty="0">
+              <a:solidFill>
+                <a:schemeClr val="tx2">
+                  <a:lumMod val="20000"/>
+                  <a:lumOff val="80000"/>
+                </a:schemeClr>
+              </a:solidFill>
+              <a:latin typeface="Segoe UI Light" panose="020B0502040204020203" pitchFamily="34" charset="0"/>
+              <a:cs typeface="Segoe UI Light" panose="020B0502040204020203" pitchFamily="34" charset="0"/>
+            </a:endParaRPr>
+          </a:p>
+        </p:txBody>
+      </p:sp>
+      <p:sp>
+        <p:nvSpPr>
+          <p:cNvPr id="2" name="Rectangle 1">
+            <a:extLst>
+              <a:ext uri="{FF2B5EF4-FFF2-40B4-BE49-F238E27FC236}">
+                <a16:creationId xmlns:a16="http://schemas.microsoft.com/office/drawing/2014/main" id="{410CDBFF-3D07-4A80-93D5-6527995591B7}"/>
+              </a:ext>
+            </a:extLst>
+          </p:cNvPr>
+          <p:cNvSpPr>
+            <a:spLocks noChangeArrowheads="1"/>
+          </p:cNvSpPr>
+          <p:nvPr/>
+        </p:nvSpPr>
+        <p:spPr bwMode="auto">
+          <a:xfrm>
+            <a:off x="1063558" y="2768981"/>
+            <a:ext cx="9202723" cy="2031325"/>
+          </a:xfrm>
+          <a:prstGeom prst="rect">
+            <a:avLst/>
+          </a:prstGeom>
+          <a:solidFill>
+            <a:srgbClr val="1E1E1E"/>
+          </a:solidFill>
+          <a:ln>
+            <a:noFill/>
+          </a:ln>
+          <a:effectLst/>
+          <a:extLst>
+            <a:ext uri="{91240B29-F687-4F45-9708-019B960494DF}">
+              <a14:hiddenLine xmlns:a14="http://schemas.microsoft.com/office/drawing/2010/main" w="9525">
+                <a:solidFill>
+                  <a:schemeClr val="tx1"/>
+                </a:solidFill>
+                <a:miter lim="800000"/>
+                <a:headEnd/>
+                <a:tailEnd/>
+              </a14:hiddenLine>
+            </a:ext>
+            <a:ext uri="{AF507438-7753-43E0-B8FC-AC1667EBCBE1}">
+              <a14:hiddenEffects xmlns:a14="http://schemas.microsoft.com/office/drawing/2010/main">
+                <a:effectLst>
+                  <a:outerShdw dist="35921" dir="2700000" algn="ctr" rotWithShape="0">
+                    <a:schemeClr val="bg2"/>
+                  </a:outerShdw>
+                </a:effectLst>
+              </a14:hiddenEffects>
+            </a:ext>
+          </a:extLst>
+        </p:spPr>
+        <p:txBody>
+          <a:bodyPr vert="horz" wrap="square" lIns="91440" tIns="45720" rIns="91440" bIns="45720" numCol="1" anchor="ctr" anchorCtr="0" compatLnSpc="1">
+            <a:prstTxWarp prst="textNoShape">
+              <a:avLst/>
+            </a:prstTxWarp>
+            <a:spAutoFit/>
+          </a:bodyPr>
+          <a:lstStyle/>
+          <a:p>
+            <a:pPr marL="0" marR="0" lvl="0" indent="0" algn="l" defTabSz="914400" rtl="0" eaLnBrk="0" fontAlgn="base" latinLnBrk="0" hangingPunct="0">
+              <a:lnSpc>
+                <a:spcPct val="100000"/>
+              </a:lnSpc>
+              <a:spcBef>
+                <a:spcPct val="0"/>
+              </a:spcBef>
+              <a:spcAft>
+                <a:spcPct val="0"/>
+              </a:spcAft>
+              <a:buClrTx/>
+              <a:buSzTx/>
+              <a:buFontTx/>
+              <a:buNone/>
+              <a:tabLst/>
+            </a:pPr>
+            <a:r>
+              <a:rPr kumimoji="0" lang="en-US" altLang="en-US" sz="900" b="0" i="0" u="none" strike="noStrike" cap="none" normalizeH="0" baseline="0" dirty="0">
+                <a:ln>
+                  <a:noFill/>
+                </a:ln>
+                <a:solidFill>
+                  <a:srgbClr val="569CD6"/>
+                </a:solidFill>
+                <a:effectLst/>
+                <a:latin typeface="Fira Code" panose="020B0809050000020004" pitchFamily="49" charset="0"/>
+              </a:rPr>
+              <a:t>public</a:t>
+            </a:r>
+            <a:r>
+              <a:rPr kumimoji="0" lang="en-US" altLang="en-US" sz="900" b="0" i="0" u="none" strike="noStrike" cap="none" normalizeH="0" baseline="0" dirty="0">
+                <a:ln>
+                  <a:noFill/>
+                </a:ln>
+                <a:solidFill>
+                  <a:srgbClr val="DCDCDC"/>
+                </a:solidFill>
+                <a:effectLst/>
+                <a:latin typeface="Fira Code" panose="020B0809050000020004" pitchFamily="49" charset="0"/>
+              </a:rPr>
+              <a:t> </a:t>
+            </a:r>
+            <a:r>
+              <a:rPr kumimoji="0" lang="en-US" altLang="en-US" sz="900" b="0" i="0" u="none" strike="noStrike" cap="none" normalizeH="0" baseline="0" dirty="0">
+                <a:ln>
+                  <a:noFill/>
+                </a:ln>
+                <a:solidFill>
+                  <a:srgbClr val="569CD6"/>
+                </a:solidFill>
+                <a:effectLst/>
+                <a:latin typeface="Fira Code" panose="020B0809050000020004" pitchFamily="49" charset="0"/>
+              </a:rPr>
+              <a:t>class</a:t>
+            </a:r>
+            <a:r>
+              <a:rPr kumimoji="0" lang="en-US" altLang="en-US" sz="900" b="0" i="0" u="none" strike="noStrike" cap="none" normalizeH="0" baseline="0" dirty="0">
+                <a:ln>
+                  <a:noFill/>
+                </a:ln>
+                <a:solidFill>
+                  <a:srgbClr val="DCDCDC"/>
+                </a:solidFill>
+                <a:effectLst/>
+                <a:latin typeface="Fira Code" panose="020B0809050000020004" pitchFamily="49" charset="0"/>
+              </a:rPr>
+              <a:t> </a:t>
+            </a:r>
+            <a:r>
+              <a:rPr kumimoji="0" lang="en-US" altLang="en-US" sz="900" b="0" i="0" u="none" strike="noStrike" cap="none" normalizeH="0" baseline="0" dirty="0">
+                <a:ln>
+                  <a:noFill/>
+                </a:ln>
+                <a:solidFill>
+                  <a:srgbClr val="4EC9B0"/>
+                </a:solidFill>
+                <a:effectLst/>
+                <a:latin typeface="Fira Code" panose="020B0809050000020004" pitchFamily="49" charset="0"/>
+              </a:rPr>
+              <a:t>LoggingPipelineModule</a:t>
+            </a:r>
+            <a:r>
+              <a:rPr kumimoji="0" lang="en-US" altLang="en-US" sz="900" b="0" i="0" u="none" strike="noStrike" cap="none" normalizeH="0" baseline="0" dirty="0">
+                <a:ln>
+                  <a:noFill/>
+                </a:ln>
+                <a:solidFill>
+                  <a:srgbClr val="DCDCDC"/>
+                </a:solidFill>
+                <a:effectLst/>
+                <a:latin typeface="Fira Code" panose="020B0809050000020004" pitchFamily="49" charset="0"/>
+              </a:rPr>
+              <a:t> : </a:t>
+            </a:r>
+            <a:r>
+              <a:rPr kumimoji="0" lang="en-US" altLang="en-US" sz="900" b="0" i="0" u="none" strike="noStrike" cap="none" normalizeH="0" baseline="0" dirty="0">
+                <a:ln>
+                  <a:noFill/>
+                </a:ln>
+                <a:solidFill>
+                  <a:srgbClr val="4EC9B0"/>
+                </a:solidFill>
+                <a:effectLst/>
+                <a:latin typeface="Fira Code" panose="020B0809050000020004" pitchFamily="49" charset="0"/>
+              </a:rPr>
+              <a:t>HubPipelineModule</a:t>
+            </a:r>
+            <a:r>
+              <a:rPr kumimoji="0" lang="en-US" altLang="en-US" sz="900" b="0" i="0" u="none" strike="noStrike" cap="none" normalizeH="0" baseline="0" dirty="0">
+                <a:ln>
+                  <a:noFill/>
+                </a:ln>
+                <a:solidFill>
+                  <a:srgbClr val="DCDCDC"/>
+                </a:solidFill>
+                <a:effectLst/>
+                <a:latin typeface="Fira Code" panose="020B0809050000020004" pitchFamily="49" charset="0"/>
+              </a:rPr>
+              <a:t> </a:t>
+            </a:r>
+          </a:p>
+          <a:p>
+            <a:pPr marL="0" marR="0" lvl="0" indent="0" algn="l" defTabSz="914400" rtl="0" eaLnBrk="0" fontAlgn="base" latinLnBrk="0" hangingPunct="0">
+              <a:lnSpc>
+                <a:spcPct val="100000"/>
+              </a:lnSpc>
+              <a:spcBef>
+                <a:spcPct val="0"/>
+              </a:spcBef>
+              <a:spcAft>
+                <a:spcPct val="0"/>
+              </a:spcAft>
+              <a:buClrTx/>
+              <a:buSzTx/>
+              <a:buFontTx/>
+              <a:buNone/>
+              <a:tabLst/>
+            </a:pPr>
+            <a:r>
+              <a:rPr kumimoji="0" lang="en-US" altLang="en-US" sz="900" b="0" i="0" u="none" strike="noStrike" cap="none" normalizeH="0" baseline="0" dirty="0">
+                <a:ln>
+                  <a:noFill/>
+                </a:ln>
+                <a:solidFill>
+                  <a:srgbClr val="DCDCDC"/>
+                </a:solidFill>
+                <a:effectLst/>
+                <a:latin typeface="Fira Code" panose="020B0809050000020004" pitchFamily="49" charset="0"/>
+              </a:rPr>
+              <a:t>{</a:t>
+            </a:r>
+          </a:p>
+          <a:p>
+            <a:pPr marL="0" marR="0" lvl="0" indent="0" algn="l" defTabSz="914400" rtl="0" eaLnBrk="0" fontAlgn="base" latinLnBrk="0" hangingPunct="0">
+              <a:lnSpc>
+                <a:spcPct val="100000"/>
+              </a:lnSpc>
+              <a:spcBef>
+                <a:spcPct val="0"/>
+              </a:spcBef>
+              <a:spcAft>
+                <a:spcPct val="0"/>
+              </a:spcAft>
+              <a:buClrTx/>
+              <a:buSzTx/>
+              <a:buFontTx/>
+              <a:buNone/>
+              <a:tabLst/>
+            </a:pPr>
+            <a:r>
+              <a:rPr kumimoji="0" lang="en-US" altLang="en-US" sz="900" b="0" i="0" u="none" strike="noStrike" cap="none" normalizeH="0" baseline="0" dirty="0">
+                <a:ln>
+                  <a:noFill/>
+                </a:ln>
+                <a:solidFill>
+                  <a:srgbClr val="DCDCDC"/>
+                </a:solidFill>
+                <a:effectLst/>
+                <a:latin typeface="Fira Code" panose="020B0809050000020004" pitchFamily="49" charset="0"/>
+              </a:rPr>
+              <a:t>     </a:t>
+            </a:r>
+            <a:r>
+              <a:rPr kumimoji="0" lang="en-US" altLang="en-US" sz="900" b="0" i="0" u="none" strike="noStrike" cap="none" normalizeH="0" baseline="0" dirty="0">
+                <a:ln>
+                  <a:noFill/>
+                </a:ln>
+                <a:solidFill>
+                  <a:srgbClr val="569CD6"/>
+                </a:solidFill>
+                <a:effectLst/>
+                <a:latin typeface="Fira Code" panose="020B0809050000020004" pitchFamily="49" charset="0"/>
+              </a:rPr>
+              <a:t>protected</a:t>
+            </a:r>
+            <a:r>
+              <a:rPr kumimoji="0" lang="en-US" altLang="en-US" sz="900" b="0" i="0" u="none" strike="noStrike" cap="none" normalizeH="0" baseline="0" dirty="0">
+                <a:ln>
+                  <a:noFill/>
+                </a:ln>
+                <a:solidFill>
+                  <a:srgbClr val="DCDCDC"/>
+                </a:solidFill>
+                <a:effectLst/>
+                <a:latin typeface="Fira Code" panose="020B0809050000020004" pitchFamily="49" charset="0"/>
+              </a:rPr>
+              <a:t> </a:t>
+            </a:r>
+            <a:r>
+              <a:rPr kumimoji="0" lang="en-US" altLang="en-US" sz="900" b="0" i="0" u="none" strike="noStrike" cap="none" normalizeH="0" baseline="0" dirty="0">
+                <a:ln>
+                  <a:noFill/>
+                </a:ln>
+                <a:solidFill>
+                  <a:srgbClr val="569CD6"/>
+                </a:solidFill>
+                <a:effectLst/>
+                <a:latin typeface="Fira Code" panose="020B0809050000020004" pitchFamily="49" charset="0"/>
+              </a:rPr>
+              <a:t>override</a:t>
+            </a:r>
+            <a:r>
+              <a:rPr kumimoji="0" lang="en-US" altLang="en-US" sz="900" b="0" i="0" u="none" strike="noStrike" cap="none" normalizeH="0" baseline="0" dirty="0">
+                <a:ln>
+                  <a:noFill/>
+                </a:ln>
+                <a:solidFill>
+                  <a:srgbClr val="DCDCDC"/>
+                </a:solidFill>
+                <a:effectLst/>
+                <a:latin typeface="Fira Code" panose="020B0809050000020004" pitchFamily="49" charset="0"/>
+              </a:rPr>
+              <a:t> </a:t>
+            </a:r>
+            <a:r>
+              <a:rPr kumimoji="0" lang="en-US" altLang="en-US" sz="900" b="0" i="0" u="none" strike="noStrike" cap="none" normalizeH="0" baseline="0" dirty="0">
+                <a:ln>
+                  <a:noFill/>
+                </a:ln>
+                <a:solidFill>
+                  <a:srgbClr val="569CD6"/>
+                </a:solidFill>
+                <a:effectLst/>
+                <a:latin typeface="Fira Code" panose="020B0809050000020004" pitchFamily="49" charset="0"/>
+              </a:rPr>
+              <a:t>bool</a:t>
+            </a:r>
+            <a:r>
+              <a:rPr kumimoji="0" lang="en-US" altLang="en-US" sz="900" b="0" i="0" u="none" strike="noStrike" cap="none" normalizeH="0" baseline="0" dirty="0">
+                <a:ln>
+                  <a:noFill/>
+                </a:ln>
+                <a:solidFill>
+                  <a:srgbClr val="DCDCDC"/>
+                </a:solidFill>
+                <a:effectLst/>
+                <a:latin typeface="Fira Code" panose="020B0809050000020004" pitchFamily="49" charset="0"/>
+              </a:rPr>
+              <a:t> </a:t>
+            </a:r>
+            <a:r>
+              <a:rPr kumimoji="0" lang="en-US" altLang="en-US" sz="900" b="0" i="0" u="none" strike="noStrike" cap="none" normalizeH="0" baseline="0" dirty="0">
+                <a:ln>
+                  <a:noFill/>
+                </a:ln>
+                <a:solidFill>
+                  <a:srgbClr val="DCDCAA"/>
+                </a:solidFill>
+                <a:effectLst/>
+                <a:latin typeface="Fira Code" panose="020B0809050000020004" pitchFamily="49" charset="0"/>
+              </a:rPr>
+              <a:t>OnBeforeIncoming</a:t>
+            </a:r>
+            <a:r>
+              <a:rPr kumimoji="0" lang="en-US" altLang="en-US" sz="900" b="0" i="0" u="none" strike="noStrike" cap="none" normalizeH="0" baseline="0" dirty="0">
+                <a:ln>
+                  <a:noFill/>
+                </a:ln>
+                <a:solidFill>
+                  <a:srgbClr val="DCDCDC"/>
+                </a:solidFill>
+                <a:effectLst/>
+                <a:latin typeface="Fira Code" panose="020B0809050000020004" pitchFamily="49" charset="0"/>
+              </a:rPr>
+              <a:t>(</a:t>
+            </a:r>
+            <a:r>
+              <a:rPr kumimoji="0" lang="en-US" altLang="en-US" sz="900" b="0" i="0" u="none" strike="noStrike" cap="none" normalizeH="0" baseline="0" dirty="0">
+                <a:ln>
+                  <a:noFill/>
+                </a:ln>
+                <a:solidFill>
+                  <a:srgbClr val="B8D7A3"/>
+                </a:solidFill>
+                <a:effectLst/>
+                <a:latin typeface="Fira Code" panose="020B0809050000020004" pitchFamily="49" charset="0"/>
+              </a:rPr>
+              <a:t>IHubIncomingInvokerContext</a:t>
+            </a:r>
+            <a:r>
+              <a:rPr kumimoji="0" lang="en-US" altLang="en-US" sz="900" b="0" i="0" u="none" strike="noStrike" cap="none" normalizeH="0" baseline="0" dirty="0">
+                <a:ln>
+                  <a:noFill/>
+                </a:ln>
+                <a:solidFill>
+                  <a:srgbClr val="DCDCDC"/>
+                </a:solidFill>
+                <a:effectLst/>
+                <a:latin typeface="Fira Code" panose="020B0809050000020004" pitchFamily="49" charset="0"/>
+              </a:rPr>
+              <a:t> </a:t>
+            </a:r>
+            <a:r>
+              <a:rPr kumimoji="0" lang="en-US" altLang="en-US" sz="900" b="0" i="0" u="none" strike="noStrike" cap="none" normalizeH="0" baseline="0" dirty="0">
+                <a:ln>
+                  <a:noFill/>
+                </a:ln>
+                <a:solidFill>
+                  <a:srgbClr val="9CDCFE"/>
+                </a:solidFill>
+                <a:effectLst/>
+                <a:latin typeface="Fira Code" panose="020B0809050000020004" pitchFamily="49" charset="0"/>
+              </a:rPr>
+              <a:t>context</a:t>
+            </a:r>
+            <a:r>
+              <a:rPr kumimoji="0" lang="en-US" altLang="en-US" sz="900" b="0" i="0" u="none" strike="noStrike" cap="none" normalizeH="0" baseline="0" dirty="0">
+                <a:ln>
+                  <a:noFill/>
+                </a:ln>
+                <a:solidFill>
+                  <a:srgbClr val="DCDCDC"/>
+                </a:solidFill>
+                <a:effectLst/>
+                <a:latin typeface="Fira Code" panose="020B0809050000020004" pitchFamily="49" charset="0"/>
+              </a:rPr>
+              <a:t>)</a:t>
+            </a:r>
+          </a:p>
+          <a:p>
+            <a:pPr marL="0" marR="0" lvl="0" indent="0" algn="l" defTabSz="914400" rtl="0" eaLnBrk="0" fontAlgn="base" latinLnBrk="0" hangingPunct="0">
+              <a:lnSpc>
+                <a:spcPct val="100000"/>
+              </a:lnSpc>
+              <a:spcBef>
+                <a:spcPct val="0"/>
+              </a:spcBef>
+              <a:spcAft>
+                <a:spcPct val="0"/>
+              </a:spcAft>
+              <a:buClrTx/>
+              <a:buSzTx/>
+              <a:buFontTx/>
+              <a:buNone/>
+              <a:tabLst/>
+            </a:pPr>
+            <a:r>
+              <a:rPr kumimoji="0" lang="en-US" altLang="en-US" sz="900" b="0" i="0" u="none" strike="noStrike" cap="none" normalizeH="0" baseline="0" dirty="0">
+                <a:ln>
+                  <a:noFill/>
+                </a:ln>
+                <a:solidFill>
+                  <a:srgbClr val="DCDCDC"/>
+                </a:solidFill>
+                <a:effectLst/>
+                <a:latin typeface="Fira Code" panose="020B0809050000020004" pitchFamily="49" charset="0"/>
+              </a:rPr>
+              <a:t>     {</a:t>
+            </a:r>
+          </a:p>
+          <a:p>
+            <a:pPr marL="0" marR="0" lvl="0" indent="0" algn="l" defTabSz="914400" rtl="0" eaLnBrk="0" fontAlgn="base" latinLnBrk="0" hangingPunct="0">
+              <a:lnSpc>
+                <a:spcPct val="100000"/>
+              </a:lnSpc>
+              <a:spcBef>
+                <a:spcPct val="0"/>
+              </a:spcBef>
+              <a:spcAft>
+                <a:spcPct val="0"/>
+              </a:spcAft>
+              <a:buClrTx/>
+              <a:buSzTx/>
+              <a:buFontTx/>
+              <a:buNone/>
+              <a:tabLst/>
+            </a:pPr>
+            <a:r>
+              <a:rPr kumimoji="0" lang="en-US" altLang="en-US" sz="900" b="0" i="0" u="none" strike="noStrike" cap="none" normalizeH="0" baseline="0" dirty="0">
+                <a:ln>
+                  <a:noFill/>
+                </a:ln>
+                <a:solidFill>
+                  <a:srgbClr val="DCDCDC"/>
+                </a:solidFill>
+                <a:effectLst/>
+                <a:latin typeface="Fira Code" panose="020B0809050000020004" pitchFamily="49" charset="0"/>
+              </a:rPr>
+              <a:t>         </a:t>
+            </a:r>
+            <a:r>
+              <a:rPr kumimoji="0" lang="en-US" altLang="en-US" sz="900" b="0" i="0" u="none" strike="noStrike" cap="none" normalizeH="0" baseline="0" dirty="0">
+                <a:ln>
+                  <a:noFill/>
+                </a:ln>
+                <a:solidFill>
+                  <a:srgbClr val="4EC9B0"/>
+                </a:solidFill>
+                <a:effectLst/>
+                <a:latin typeface="Fira Code" panose="020B0809050000020004" pitchFamily="49" charset="0"/>
+              </a:rPr>
+              <a:t>Debug</a:t>
+            </a:r>
+            <a:r>
+              <a:rPr kumimoji="0" lang="en-US" altLang="en-US" sz="900" b="0" i="0" u="none" strike="noStrike" cap="none" normalizeH="0" baseline="0" dirty="0">
+                <a:ln>
+                  <a:noFill/>
+                </a:ln>
+                <a:solidFill>
+                  <a:srgbClr val="B4B4B4"/>
+                </a:solidFill>
+                <a:effectLst/>
+                <a:latin typeface="Fira Code" panose="020B0809050000020004" pitchFamily="49" charset="0"/>
+              </a:rPr>
+              <a:t>.</a:t>
+            </a:r>
+            <a:r>
+              <a:rPr kumimoji="0" lang="en-US" altLang="en-US" sz="900" b="0" i="0" u="none" strike="noStrike" cap="none" normalizeH="0" baseline="0" dirty="0">
+                <a:ln>
+                  <a:noFill/>
+                </a:ln>
+                <a:solidFill>
+                  <a:srgbClr val="DCDCAA"/>
+                </a:solidFill>
+                <a:effectLst/>
+                <a:latin typeface="Fira Code" panose="020B0809050000020004" pitchFamily="49" charset="0"/>
+              </a:rPr>
+              <a:t>WriteLine</a:t>
+            </a:r>
+            <a:r>
+              <a:rPr kumimoji="0" lang="en-US" altLang="en-US" sz="900" b="0" i="0" u="none" strike="noStrike" cap="none" normalizeH="0" baseline="0" dirty="0">
+                <a:ln>
+                  <a:noFill/>
+                </a:ln>
+                <a:solidFill>
+                  <a:srgbClr val="DCDCDC"/>
+                </a:solidFill>
+                <a:effectLst/>
+                <a:latin typeface="Fira Code" panose="020B0809050000020004" pitchFamily="49" charset="0"/>
+              </a:rPr>
+              <a:t>(</a:t>
+            </a:r>
+            <a:r>
+              <a:rPr kumimoji="0" lang="en-US" altLang="en-US" sz="900" b="0" i="0" u="none" strike="noStrike" cap="none" normalizeH="0" baseline="0" dirty="0">
+                <a:ln>
+                  <a:noFill/>
+                </a:ln>
+                <a:solidFill>
+                  <a:srgbClr val="D69D85"/>
+                </a:solidFill>
+                <a:effectLst/>
+                <a:latin typeface="Fira Code" panose="020B0809050000020004" pitchFamily="49" charset="0"/>
+              </a:rPr>
+              <a:t>"=&gt; Invoking "</a:t>
+            </a:r>
+            <a:r>
+              <a:rPr kumimoji="0" lang="en-US" altLang="en-US" sz="900" b="0" i="0" u="none" strike="noStrike" cap="none" normalizeH="0" baseline="0" dirty="0">
+                <a:ln>
+                  <a:noFill/>
+                </a:ln>
+                <a:solidFill>
+                  <a:srgbClr val="DCDCDC"/>
+                </a:solidFill>
+                <a:effectLst/>
+                <a:latin typeface="Fira Code" panose="020B0809050000020004" pitchFamily="49" charset="0"/>
+              </a:rPr>
+              <a:t> </a:t>
+            </a:r>
+            <a:r>
+              <a:rPr kumimoji="0" lang="en-US" altLang="en-US" sz="900" b="0" i="0" u="none" strike="noStrike" cap="none" normalizeH="0" baseline="0" dirty="0">
+                <a:ln>
+                  <a:noFill/>
+                </a:ln>
+                <a:solidFill>
+                  <a:srgbClr val="B4B4B4"/>
+                </a:solidFill>
+                <a:effectLst/>
+                <a:latin typeface="Fira Code" panose="020B0809050000020004" pitchFamily="49" charset="0"/>
+              </a:rPr>
+              <a:t>+</a:t>
+            </a:r>
+            <a:r>
+              <a:rPr kumimoji="0" lang="en-US" altLang="en-US" sz="900" b="0" i="0" u="none" strike="noStrike" cap="none" normalizeH="0" baseline="0" dirty="0">
+                <a:ln>
+                  <a:noFill/>
+                </a:ln>
+                <a:solidFill>
+                  <a:srgbClr val="DCDCDC"/>
+                </a:solidFill>
+                <a:effectLst/>
+                <a:latin typeface="Fira Code" panose="020B0809050000020004" pitchFamily="49" charset="0"/>
+              </a:rPr>
+              <a:t> </a:t>
+            </a:r>
+            <a:r>
+              <a:rPr kumimoji="0" lang="en-US" altLang="en-US" sz="900" b="0" i="0" u="none" strike="noStrike" cap="none" normalizeH="0" baseline="0" dirty="0">
+                <a:ln>
+                  <a:noFill/>
+                </a:ln>
+                <a:solidFill>
+                  <a:srgbClr val="9CDCFE"/>
+                </a:solidFill>
+                <a:effectLst/>
+                <a:latin typeface="Fira Code" panose="020B0809050000020004" pitchFamily="49" charset="0"/>
+              </a:rPr>
+              <a:t>context</a:t>
+            </a:r>
+            <a:r>
+              <a:rPr kumimoji="0" lang="en-US" altLang="en-US" sz="900" b="0" i="0" u="none" strike="noStrike" cap="none" normalizeH="0" baseline="0" dirty="0">
+                <a:ln>
+                  <a:noFill/>
+                </a:ln>
+                <a:solidFill>
+                  <a:srgbClr val="B4B4B4"/>
+                </a:solidFill>
+                <a:effectLst/>
+                <a:latin typeface="Fira Code" panose="020B0809050000020004" pitchFamily="49" charset="0"/>
+              </a:rPr>
+              <a:t>.</a:t>
+            </a:r>
+            <a:r>
+              <a:rPr kumimoji="0" lang="en-US" altLang="en-US" sz="900" b="0" i="0" u="none" strike="noStrike" cap="none" normalizeH="0" baseline="0" dirty="0">
+                <a:ln>
+                  <a:noFill/>
+                </a:ln>
+                <a:solidFill>
+                  <a:srgbClr val="DCDCDC"/>
+                </a:solidFill>
+                <a:effectLst/>
+                <a:latin typeface="Fira Code" panose="020B0809050000020004" pitchFamily="49" charset="0"/>
+              </a:rPr>
+              <a:t>MethodDescriptor</a:t>
+            </a:r>
+            <a:r>
+              <a:rPr kumimoji="0" lang="en-US" altLang="en-US" sz="900" b="0" i="0" u="none" strike="noStrike" cap="none" normalizeH="0" baseline="0" dirty="0">
+                <a:ln>
+                  <a:noFill/>
+                </a:ln>
+                <a:solidFill>
+                  <a:srgbClr val="B4B4B4"/>
+                </a:solidFill>
+                <a:effectLst/>
+                <a:latin typeface="Fira Code" panose="020B0809050000020004" pitchFamily="49" charset="0"/>
+              </a:rPr>
+              <a:t>.</a:t>
+            </a:r>
+            <a:r>
+              <a:rPr kumimoji="0" lang="en-US" altLang="en-US" sz="900" b="0" i="0" u="none" strike="noStrike" cap="none" normalizeH="0" baseline="0" dirty="0">
+                <a:ln>
+                  <a:noFill/>
+                </a:ln>
+                <a:solidFill>
+                  <a:srgbClr val="DCDCDC"/>
+                </a:solidFill>
+                <a:effectLst/>
+                <a:latin typeface="Fira Code" panose="020B0809050000020004" pitchFamily="49" charset="0"/>
+              </a:rPr>
+              <a:t>Name </a:t>
+            </a:r>
+            <a:r>
+              <a:rPr kumimoji="0" lang="en-US" altLang="en-US" sz="900" b="0" i="0" u="none" strike="noStrike" cap="none" normalizeH="0" baseline="0" dirty="0">
+                <a:ln>
+                  <a:noFill/>
+                </a:ln>
+                <a:solidFill>
+                  <a:srgbClr val="B4B4B4"/>
+                </a:solidFill>
+                <a:effectLst/>
+                <a:latin typeface="Fira Code" panose="020B0809050000020004" pitchFamily="49" charset="0"/>
+              </a:rPr>
+              <a:t>+</a:t>
+            </a:r>
+            <a:r>
+              <a:rPr kumimoji="0" lang="en-US" altLang="en-US" sz="900" b="0" i="0" u="none" strike="noStrike" cap="none" normalizeH="0" baseline="0" dirty="0">
+                <a:ln>
+                  <a:noFill/>
+                </a:ln>
+                <a:solidFill>
+                  <a:srgbClr val="DCDCDC"/>
+                </a:solidFill>
+                <a:effectLst/>
+                <a:latin typeface="Fira Code" panose="020B0809050000020004" pitchFamily="49" charset="0"/>
+              </a:rPr>
+              <a:t> </a:t>
+            </a:r>
+            <a:r>
+              <a:rPr kumimoji="0" lang="en-US" altLang="en-US" sz="900" b="0" i="0" u="none" strike="noStrike" cap="none" normalizeH="0" baseline="0" dirty="0">
+                <a:ln>
+                  <a:noFill/>
+                </a:ln>
+                <a:solidFill>
+                  <a:srgbClr val="D69D85"/>
+                </a:solidFill>
+                <a:effectLst/>
+                <a:latin typeface="Fira Code" panose="020B0809050000020004" pitchFamily="49" charset="0"/>
+              </a:rPr>
+              <a:t>" on hub "</a:t>
+            </a:r>
+            <a:r>
+              <a:rPr kumimoji="0" lang="en-US" altLang="en-US" sz="900" b="0" i="0" u="none" strike="noStrike" cap="none" normalizeH="0" baseline="0" dirty="0">
+                <a:ln>
+                  <a:noFill/>
+                </a:ln>
+                <a:solidFill>
+                  <a:srgbClr val="DCDCDC"/>
+                </a:solidFill>
+                <a:effectLst/>
+                <a:latin typeface="Fira Code" panose="020B0809050000020004" pitchFamily="49" charset="0"/>
+              </a:rPr>
+              <a:t> </a:t>
+            </a:r>
+            <a:r>
+              <a:rPr kumimoji="0" lang="en-US" altLang="en-US" sz="900" b="0" i="0" u="none" strike="noStrike" cap="none" normalizeH="0" baseline="0" dirty="0">
+                <a:ln>
+                  <a:noFill/>
+                </a:ln>
+                <a:solidFill>
+                  <a:srgbClr val="B4B4B4"/>
+                </a:solidFill>
+                <a:effectLst/>
+                <a:latin typeface="Fira Code" panose="020B0809050000020004" pitchFamily="49" charset="0"/>
+              </a:rPr>
+              <a:t>+</a:t>
+            </a:r>
+            <a:r>
+              <a:rPr kumimoji="0" lang="en-US" altLang="en-US" sz="900" b="0" i="0" u="none" strike="noStrike" cap="none" normalizeH="0" baseline="0" dirty="0">
+                <a:ln>
+                  <a:noFill/>
+                </a:ln>
+                <a:solidFill>
+                  <a:srgbClr val="DCDCDC"/>
+                </a:solidFill>
+                <a:effectLst/>
+                <a:latin typeface="Fira Code" panose="020B0809050000020004" pitchFamily="49" charset="0"/>
+              </a:rPr>
+              <a:t> </a:t>
+            </a:r>
+            <a:r>
+              <a:rPr kumimoji="0" lang="en-US" altLang="en-US" sz="900" b="0" i="0" u="none" strike="noStrike" cap="none" normalizeH="0" baseline="0" dirty="0">
+                <a:ln>
+                  <a:noFill/>
+                </a:ln>
+                <a:solidFill>
+                  <a:srgbClr val="9CDCFE"/>
+                </a:solidFill>
+                <a:effectLst/>
+                <a:latin typeface="Fira Code" panose="020B0809050000020004" pitchFamily="49" charset="0"/>
+              </a:rPr>
+              <a:t>context</a:t>
+            </a:r>
+            <a:r>
+              <a:rPr kumimoji="0" lang="en-US" altLang="en-US" sz="900" b="0" i="0" u="none" strike="noStrike" cap="none" normalizeH="0" baseline="0" dirty="0">
+                <a:ln>
+                  <a:noFill/>
+                </a:ln>
+                <a:solidFill>
+                  <a:srgbClr val="B4B4B4"/>
+                </a:solidFill>
+                <a:effectLst/>
+                <a:latin typeface="Fira Code" panose="020B0809050000020004" pitchFamily="49" charset="0"/>
+              </a:rPr>
+              <a:t>.</a:t>
+            </a:r>
+            <a:r>
+              <a:rPr kumimoji="0" lang="en-US" altLang="en-US" sz="900" b="0" i="0" u="none" strike="noStrike" cap="none" normalizeH="0" baseline="0" dirty="0">
+                <a:ln>
+                  <a:noFill/>
+                </a:ln>
+                <a:solidFill>
+                  <a:srgbClr val="DCDCDC"/>
+                </a:solidFill>
+                <a:effectLst/>
+                <a:latin typeface="Fira Code" panose="020B0809050000020004" pitchFamily="49" charset="0"/>
+              </a:rPr>
+              <a:t>MethodDescriptor</a:t>
+            </a:r>
+            <a:r>
+              <a:rPr kumimoji="0" lang="en-US" altLang="en-US" sz="900" b="0" i="0" u="none" strike="noStrike" cap="none" normalizeH="0" baseline="0" dirty="0">
+                <a:ln>
+                  <a:noFill/>
+                </a:ln>
+                <a:solidFill>
+                  <a:srgbClr val="B4B4B4"/>
+                </a:solidFill>
+                <a:effectLst/>
+                <a:latin typeface="Fira Code" panose="020B0809050000020004" pitchFamily="49" charset="0"/>
+              </a:rPr>
+              <a:t>.</a:t>
+            </a:r>
+            <a:r>
+              <a:rPr kumimoji="0" lang="en-US" altLang="en-US" sz="900" b="0" i="0" u="none" strike="noStrike" cap="none" normalizeH="0" baseline="0" dirty="0">
+                <a:ln>
+                  <a:noFill/>
+                </a:ln>
+                <a:solidFill>
+                  <a:srgbClr val="DCDCDC"/>
+                </a:solidFill>
+                <a:effectLst/>
+                <a:latin typeface="Fira Code" panose="020B0809050000020004" pitchFamily="49" charset="0"/>
+              </a:rPr>
+              <a:t>Hub</a:t>
+            </a:r>
+            <a:r>
+              <a:rPr kumimoji="0" lang="en-US" altLang="en-US" sz="900" b="0" i="0" u="none" strike="noStrike" cap="none" normalizeH="0" baseline="0" dirty="0">
+                <a:ln>
+                  <a:noFill/>
+                </a:ln>
+                <a:solidFill>
+                  <a:srgbClr val="B4B4B4"/>
+                </a:solidFill>
+                <a:effectLst/>
+                <a:latin typeface="Fira Code" panose="020B0809050000020004" pitchFamily="49" charset="0"/>
+              </a:rPr>
+              <a:t>.</a:t>
+            </a:r>
+            <a:r>
+              <a:rPr kumimoji="0" lang="en-US" altLang="en-US" sz="900" b="0" i="0" u="none" strike="noStrike" cap="none" normalizeH="0" baseline="0" dirty="0">
+                <a:ln>
+                  <a:noFill/>
+                </a:ln>
+                <a:solidFill>
+                  <a:srgbClr val="DCDCDC"/>
+                </a:solidFill>
+                <a:effectLst/>
+                <a:latin typeface="Fira Code" panose="020B0809050000020004" pitchFamily="49" charset="0"/>
+              </a:rPr>
+              <a:t>Name);</a:t>
+            </a:r>
+          </a:p>
+          <a:p>
+            <a:pPr marL="0" marR="0" lvl="0" indent="0" algn="l" defTabSz="914400" rtl="0" eaLnBrk="0" fontAlgn="base" latinLnBrk="0" hangingPunct="0">
+              <a:lnSpc>
+                <a:spcPct val="100000"/>
+              </a:lnSpc>
+              <a:spcBef>
+                <a:spcPct val="0"/>
+              </a:spcBef>
+              <a:spcAft>
+                <a:spcPct val="0"/>
+              </a:spcAft>
+              <a:buClrTx/>
+              <a:buSzTx/>
+              <a:buFontTx/>
+              <a:buNone/>
+              <a:tabLst/>
+            </a:pPr>
+            <a:r>
+              <a:rPr kumimoji="0" lang="en-US" altLang="en-US" sz="900" b="0" i="0" u="none" strike="noStrike" cap="none" normalizeH="0" baseline="0" dirty="0">
+                <a:ln>
+                  <a:noFill/>
+                </a:ln>
+                <a:solidFill>
+                  <a:srgbClr val="DCDCDC"/>
+                </a:solidFill>
+                <a:effectLst/>
+                <a:latin typeface="Fira Code" panose="020B0809050000020004" pitchFamily="49" charset="0"/>
+              </a:rPr>
+              <a:t>         </a:t>
+            </a:r>
+            <a:r>
+              <a:rPr kumimoji="0" lang="en-US" altLang="en-US" sz="900" b="0" i="0" u="none" strike="noStrike" cap="none" normalizeH="0" baseline="0" dirty="0">
+                <a:ln>
+                  <a:noFill/>
+                </a:ln>
+                <a:solidFill>
+                  <a:srgbClr val="D8A0DF"/>
+                </a:solidFill>
+                <a:effectLst/>
+                <a:latin typeface="Fira Code" panose="020B0809050000020004" pitchFamily="49" charset="0"/>
+              </a:rPr>
+              <a:t>return</a:t>
+            </a:r>
+            <a:r>
+              <a:rPr kumimoji="0" lang="en-US" altLang="en-US" sz="900" b="0" i="0" u="none" strike="noStrike" cap="none" normalizeH="0" baseline="0" dirty="0">
+                <a:ln>
+                  <a:noFill/>
+                </a:ln>
+                <a:solidFill>
+                  <a:srgbClr val="DCDCDC"/>
+                </a:solidFill>
+                <a:effectLst/>
+                <a:latin typeface="Fira Code" panose="020B0809050000020004" pitchFamily="49" charset="0"/>
+              </a:rPr>
+              <a:t> </a:t>
+            </a:r>
+            <a:r>
+              <a:rPr kumimoji="0" lang="en-US" altLang="en-US" sz="900" b="0" i="0" u="none" strike="noStrike" cap="none" normalizeH="0" baseline="0" dirty="0">
+                <a:ln>
+                  <a:noFill/>
+                </a:ln>
+                <a:solidFill>
+                  <a:srgbClr val="569CD6"/>
+                </a:solidFill>
+                <a:effectLst/>
+                <a:latin typeface="Fira Code" panose="020B0809050000020004" pitchFamily="49" charset="0"/>
+              </a:rPr>
+              <a:t>base</a:t>
+            </a:r>
+            <a:r>
+              <a:rPr kumimoji="0" lang="en-US" altLang="en-US" sz="900" b="0" i="0" u="none" strike="noStrike" cap="none" normalizeH="0" baseline="0" dirty="0">
+                <a:ln>
+                  <a:noFill/>
+                </a:ln>
+                <a:solidFill>
+                  <a:srgbClr val="B4B4B4"/>
+                </a:solidFill>
+                <a:effectLst/>
+                <a:latin typeface="Fira Code" panose="020B0809050000020004" pitchFamily="49" charset="0"/>
+              </a:rPr>
+              <a:t>.</a:t>
+            </a:r>
+            <a:r>
+              <a:rPr kumimoji="0" lang="en-US" altLang="en-US" sz="900" b="0" i="0" u="none" strike="noStrike" cap="none" normalizeH="0" baseline="0" dirty="0">
+                <a:ln>
+                  <a:noFill/>
+                </a:ln>
+                <a:solidFill>
+                  <a:srgbClr val="DCDCAA"/>
+                </a:solidFill>
+                <a:effectLst/>
+                <a:latin typeface="Fira Code" panose="020B0809050000020004" pitchFamily="49" charset="0"/>
+              </a:rPr>
+              <a:t>OnBeforeIncoming</a:t>
+            </a:r>
+            <a:r>
+              <a:rPr kumimoji="0" lang="en-US" altLang="en-US" sz="900" b="0" i="0" u="none" strike="noStrike" cap="none" normalizeH="0" baseline="0" dirty="0">
+                <a:ln>
+                  <a:noFill/>
+                </a:ln>
+                <a:solidFill>
+                  <a:srgbClr val="DCDCDC"/>
+                </a:solidFill>
+                <a:effectLst/>
+                <a:latin typeface="Fira Code" panose="020B0809050000020004" pitchFamily="49" charset="0"/>
+              </a:rPr>
+              <a:t>(</a:t>
+            </a:r>
+            <a:r>
+              <a:rPr kumimoji="0" lang="en-US" altLang="en-US" sz="900" b="0" i="0" u="none" strike="noStrike" cap="none" normalizeH="0" baseline="0" dirty="0">
+                <a:ln>
+                  <a:noFill/>
+                </a:ln>
+                <a:solidFill>
+                  <a:srgbClr val="9CDCFE"/>
+                </a:solidFill>
+                <a:effectLst/>
+                <a:latin typeface="Fira Code" panose="020B0809050000020004" pitchFamily="49" charset="0"/>
+              </a:rPr>
+              <a:t>context</a:t>
+            </a:r>
+            <a:r>
+              <a:rPr kumimoji="0" lang="en-US" altLang="en-US" sz="900" b="0" i="0" u="none" strike="noStrike" cap="none" normalizeH="0" baseline="0" dirty="0">
+                <a:ln>
+                  <a:noFill/>
+                </a:ln>
+                <a:solidFill>
+                  <a:srgbClr val="DCDCDC"/>
+                </a:solidFill>
+                <a:effectLst/>
+                <a:latin typeface="Fira Code" panose="020B0809050000020004" pitchFamily="49" charset="0"/>
+              </a:rPr>
+              <a:t>);</a:t>
+            </a:r>
+          </a:p>
+          <a:p>
+            <a:pPr marL="0" marR="0" lvl="0" indent="0" algn="l" defTabSz="914400" rtl="0" eaLnBrk="0" fontAlgn="base" latinLnBrk="0" hangingPunct="0">
+              <a:lnSpc>
+                <a:spcPct val="100000"/>
+              </a:lnSpc>
+              <a:spcBef>
+                <a:spcPct val="0"/>
+              </a:spcBef>
+              <a:spcAft>
+                <a:spcPct val="0"/>
+              </a:spcAft>
+              <a:buClrTx/>
+              <a:buSzTx/>
+              <a:buFontTx/>
+              <a:buNone/>
+              <a:tabLst/>
+            </a:pPr>
+            <a:r>
+              <a:rPr kumimoji="0" lang="en-US" altLang="en-US" sz="900" b="0" i="0" u="none" strike="noStrike" cap="none" normalizeH="0" baseline="0" dirty="0">
+                <a:ln>
+                  <a:noFill/>
+                </a:ln>
+                <a:solidFill>
+                  <a:srgbClr val="DCDCDC"/>
+                </a:solidFill>
+                <a:effectLst/>
+                <a:latin typeface="Fira Code" panose="020B0809050000020004" pitchFamily="49" charset="0"/>
+              </a:rPr>
+              <a:t>     }</a:t>
+            </a:r>
+          </a:p>
+          <a:p>
+            <a:pPr marL="0" marR="0" lvl="0" indent="0" algn="l" defTabSz="914400" rtl="0" eaLnBrk="0" fontAlgn="base" latinLnBrk="0" hangingPunct="0">
+              <a:lnSpc>
+                <a:spcPct val="100000"/>
+              </a:lnSpc>
+              <a:spcBef>
+                <a:spcPct val="0"/>
+              </a:spcBef>
+              <a:spcAft>
+                <a:spcPct val="0"/>
+              </a:spcAft>
+              <a:buClrTx/>
+              <a:buSzTx/>
+              <a:buFontTx/>
+              <a:buNone/>
+              <a:tabLst/>
+            </a:pPr>
+            <a:endParaRPr lang="en-US" altLang="en-US" sz="900" dirty="0">
+              <a:solidFill>
+                <a:srgbClr val="DCDCDC"/>
+              </a:solidFill>
+              <a:latin typeface="Fira Code" panose="020B0809050000020004" pitchFamily="49" charset="0"/>
+            </a:endParaRPr>
+          </a:p>
+          <a:p>
+            <a:pPr marL="0" marR="0" lvl="0" indent="0" algn="l" defTabSz="914400" rtl="0" eaLnBrk="0" fontAlgn="base" latinLnBrk="0" hangingPunct="0">
+              <a:lnSpc>
+                <a:spcPct val="100000"/>
+              </a:lnSpc>
+              <a:spcBef>
+                <a:spcPct val="0"/>
+              </a:spcBef>
+              <a:spcAft>
+                <a:spcPct val="0"/>
+              </a:spcAft>
+              <a:buClrTx/>
+              <a:buSzTx/>
+              <a:buFontTx/>
+              <a:buNone/>
+              <a:tabLst/>
+            </a:pPr>
+            <a:r>
+              <a:rPr kumimoji="0" lang="en-US" altLang="en-US" sz="900" b="0" i="0" u="none" strike="noStrike" cap="none" normalizeH="0" baseline="0" dirty="0">
+                <a:ln>
+                  <a:noFill/>
+                </a:ln>
+                <a:solidFill>
+                  <a:srgbClr val="DCDCDC"/>
+                </a:solidFill>
+                <a:effectLst/>
+                <a:latin typeface="Fira Code" panose="020B0809050000020004" pitchFamily="49" charset="0"/>
+              </a:rPr>
+              <a:t>     </a:t>
+            </a:r>
+            <a:r>
+              <a:rPr kumimoji="0" lang="en-US" altLang="en-US" sz="900" b="0" i="0" u="none" strike="noStrike" cap="none" normalizeH="0" baseline="0" dirty="0">
+                <a:ln>
+                  <a:noFill/>
+                </a:ln>
+                <a:solidFill>
+                  <a:srgbClr val="569CD6"/>
+                </a:solidFill>
+                <a:effectLst/>
+                <a:latin typeface="Fira Code" panose="020B0809050000020004" pitchFamily="49" charset="0"/>
+              </a:rPr>
+              <a:t>protected</a:t>
+            </a:r>
+            <a:r>
+              <a:rPr kumimoji="0" lang="en-US" altLang="en-US" sz="900" b="0" i="0" u="none" strike="noStrike" cap="none" normalizeH="0" baseline="0" dirty="0">
+                <a:ln>
+                  <a:noFill/>
+                </a:ln>
+                <a:solidFill>
+                  <a:srgbClr val="DCDCDC"/>
+                </a:solidFill>
+                <a:effectLst/>
+                <a:latin typeface="Fira Code" panose="020B0809050000020004" pitchFamily="49" charset="0"/>
+              </a:rPr>
+              <a:t> </a:t>
+            </a:r>
+            <a:r>
+              <a:rPr kumimoji="0" lang="en-US" altLang="en-US" sz="900" b="0" i="0" u="none" strike="noStrike" cap="none" normalizeH="0" baseline="0" dirty="0">
+                <a:ln>
+                  <a:noFill/>
+                </a:ln>
+                <a:solidFill>
+                  <a:srgbClr val="569CD6"/>
+                </a:solidFill>
+                <a:effectLst/>
+                <a:latin typeface="Fira Code" panose="020B0809050000020004" pitchFamily="49" charset="0"/>
+              </a:rPr>
+              <a:t>override</a:t>
+            </a:r>
+            <a:r>
+              <a:rPr kumimoji="0" lang="en-US" altLang="en-US" sz="900" b="0" i="0" u="none" strike="noStrike" cap="none" normalizeH="0" baseline="0" dirty="0">
+                <a:ln>
+                  <a:noFill/>
+                </a:ln>
+                <a:solidFill>
+                  <a:srgbClr val="DCDCDC"/>
+                </a:solidFill>
+                <a:effectLst/>
+                <a:latin typeface="Fira Code" panose="020B0809050000020004" pitchFamily="49" charset="0"/>
+              </a:rPr>
+              <a:t> </a:t>
+            </a:r>
+            <a:r>
+              <a:rPr kumimoji="0" lang="en-US" altLang="en-US" sz="900" b="0" i="0" u="none" strike="noStrike" cap="none" normalizeH="0" baseline="0" dirty="0">
+                <a:ln>
+                  <a:noFill/>
+                </a:ln>
+                <a:solidFill>
+                  <a:srgbClr val="569CD6"/>
+                </a:solidFill>
+                <a:effectLst/>
+                <a:latin typeface="Fira Code" panose="020B0809050000020004" pitchFamily="49" charset="0"/>
+              </a:rPr>
+              <a:t>bool</a:t>
+            </a:r>
+            <a:r>
+              <a:rPr kumimoji="0" lang="en-US" altLang="en-US" sz="900" b="0" i="0" u="none" strike="noStrike" cap="none" normalizeH="0" baseline="0" dirty="0">
+                <a:ln>
+                  <a:noFill/>
+                </a:ln>
+                <a:solidFill>
+                  <a:srgbClr val="DCDCDC"/>
+                </a:solidFill>
+                <a:effectLst/>
+                <a:latin typeface="Fira Code" panose="020B0809050000020004" pitchFamily="49" charset="0"/>
+              </a:rPr>
+              <a:t> </a:t>
+            </a:r>
+            <a:r>
+              <a:rPr kumimoji="0" lang="en-US" altLang="en-US" sz="900" b="0" i="0" u="none" strike="noStrike" cap="none" normalizeH="0" baseline="0" dirty="0">
+                <a:ln>
+                  <a:noFill/>
+                </a:ln>
+                <a:solidFill>
+                  <a:srgbClr val="DCDCAA"/>
+                </a:solidFill>
+                <a:effectLst/>
+                <a:latin typeface="Fira Code" panose="020B0809050000020004" pitchFamily="49" charset="0"/>
+              </a:rPr>
+              <a:t>OnBeforeOutgoing</a:t>
+            </a:r>
+            <a:r>
+              <a:rPr kumimoji="0" lang="en-US" altLang="en-US" sz="900" b="0" i="0" u="none" strike="noStrike" cap="none" normalizeH="0" baseline="0" dirty="0">
+                <a:ln>
+                  <a:noFill/>
+                </a:ln>
+                <a:solidFill>
+                  <a:srgbClr val="DCDCDC"/>
+                </a:solidFill>
+                <a:effectLst/>
+                <a:latin typeface="Fira Code" panose="020B0809050000020004" pitchFamily="49" charset="0"/>
+              </a:rPr>
+              <a:t>(</a:t>
+            </a:r>
+            <a:r>
+              <a:rPr kumimoji="0" lang="en-US" altLang="en-US" sz="900" b="0" i="0" u="none" strike="noStrike" cap="none" normalizeH="0" baseline="0" dirty="0">
+                <a:ln>
+                  <a:noFill/>
+                </a:ln>
+                <a:solidFill>
+                  <a:srgbClr val="B8D7A3"/>
+                </a:solidFill>
+                <a:effectLst/>
+                <a:latin typeface="Fira Code" panose="020B0809050000020004" pitchFamily="49" charset="0"/>
+              </a:rPr>
+              <a:t>IHubOutgoingInvokerContext</a:t>
+            </a:r>
+            <a:r>
+              <a:rPr kumimoji="0" lang="en-US" altLang="en-US" sz="900" b="0" i="0" u="none" strike="noStrike" cap="none" normalizeH="0" baseline="0" dirty="0">
+                <a:ln>
+                  <a:noFill/>
+                </a:ln>
+                <a:solidFill>
+                  <a:srgbClr val="DCDCDC"/>
+                </a:solidFill>
+                <a:effectLst/>
+                <a:latin typeface="Fira Code" panose="020B0809050000020004" pitchFamily="49" charset="0"/>
+              </a:rPr>
+              <a:t> </a:t>
+            </a:r>
+            <a:r>
+              <a:rPr kumimoji="0" lang="en-US" altLang="en-US" sz="900" b="0" i="0" u="none" strike="noStrike" cap="none" normalizeH="0" baseline="0" dirty="0">
+                <a:ln>
+                  <a:noFill/>
+                </a:ln>
+                <a:solidFill>
+                  <a:srgbClr val="9CDCFE"/>
+                </a:solidFill>
+                <a:effectLst/>
+                <a:latin typeface="Fira Code" panose="020B0809050000020004" pitchFamily="49" charset="0"/>
+              </a:rPr>
+              <a:t>context</a:t>
+            </a:r>
+            <a:r>
+              <a:rPr kumimoji="0" lang="en-US" altLang="en-US" sz="900" b="0" i="0" u="none" strike="noStrike" cap="none" normalizeH="0" baseline="0" dirty="0">
+                <a:ln>
+                  <a:noFill/>
+                </a:ln>
+                <a:solidFill>
+                  <a:srgbClr val="DCDCDC"/>
+                </a:solidFill>
+                <a:effectLst/>
+                <a:latin typeface="Fira Code" panose="020B0809050000020004" pitchFamily="49" charset="0"/>
+              </a:rPr>
+              <a:t>)</a:t>
+            </a:r>
+          </a:p>
+          <a:p>
+            <a:pPr marL="0" marR="0" lvl="0" indent="0" algn="l" defTabSz="914400" rtl="0" eaLnBrk="0" fontAlgn="base" latinLnBrk="0" hangingPunct="0">
+              <a:lnSpc>
+                <a:spcPct val="100000"/>
+              </a:lnSpc>
+              <a:spcBef>
+                <a:spcPct val="0"/>
+              </a:spcBef>
+              <a:spcAft>
+                <a:spcPct val="0"/>
+              </a:spcAft>
+              <a:buClrTx/>
+              <a:buSzTx/>
+              <a:buFontTx/>
+              <a:buNone/>
+              <a:tabLst/>
+            </a:pPr>
+            <a:r>
+              <a:rPr kumimoji="0" lang="en-US" altLang="en-US" sz="900" b="0" i="0" u="none" strike="noStrike" cap="none" normalizeH="0" baseline="0" dirty="0">
+                <a:ln>
+                  <a:noFill/>
+                </a:ln>
+                <a:solidFill>
+                  <a:srgbClr val="DCDCDC"/>
+                </a:solidFill>
+                <a:effectLst/>
+                <a:latin typeface="Fira Code" panose="020B0809050000020004" pitchFamily="49" charset="0"/>
+              </a:rPr>
+              <a:t>     {</a:t>
+            </a:r>
+          </a:p>
+          <a:p>
+            <a:pPr marL="0" marR="0" lvl="0" indent="0" algn="l" defTabSz="914400" rtl="0" eaLnBrk="0" fontAlgn="base" latinLnBrk="0" hangingPunct="0">
+              <a:lnSpc>
+                <a:spcPct val="100000"/>
+              </a:lnSpc>
+              <a:spcBef>
+                <a:spcPct val="0"/>
+              </a:spcBef>
+              <a:spcAft>
+                <a:spcPct val="0"/>
+              </a:spcAft>
+              <a:buClrTx/>
+              <a:buSzTx/>
+              <a:buFontTx/>
+              <a:buNone/>
+              <a:tabLst/>
+            </a:pPr>
+            <a:r>
+              <a:rPr kumimoji="0" lang="en-US" altLang="en-US" sz="900" b="0" i="0" u="none" strike="noStrike" cap="none" normalizeH="0" baseline="0" dirty="0">
+                <a:ln>
+                  <a:noFill/>
+                </a:ln>
+                <a:solidFill>
+                  <a:srgbClr val="DCDCDC"/>
+                </a:solidFill>
+                <a:effectLst/>
+                <a:latin typeface="Fira Code" panose="020B0809050000020004" pitchFamily="49" charset="0"/>
+              </a:rPr>
+              <a:t>         </a:t>
+            </a:r>
+            <a:r>
+              <a:rPr kumimoji="0" lang="en-US" altLang="en-US" sz="900" b="0" i="0" u="none" strike="noStrike" cap="none" normalizeH="0" baseline="0" dirty="0">
+                <a:ln>
+                  <a:noFill/>
+                </a:ln>
+                <a:solidFill>
+                  <a:srgbClr val="4EC9B0"/>
+                </a:solidFill>
+                <a:effectLst/>
+                <a:latin typeface="Fira Code" panose="020B0809050000020004" pitchFamily="49" charset="0"/>
+              </a:rPr>
+              <a:t>Debug</a:t>
+            </a:r>
+            <a:r>
+              <a:rPr kumimoji="0" lang="en-US" altLang="en-US" sz="900" b="0" i="0" u="none" strike="noStrike" cap="none" normalizeH="0" baseline="0" dirty="0">
+                <a:ln>
+                  <a:noFill/>
+                </a:ln>
+                <a:solidFill>
+                  <a:srgbClr val="B4B4B4"/>
+                </a:solidFill>
+                <a:effectLst/>
+                <a:latin typeface="Fira Code" panose="020B0809050000020004" pitchFamily="49" charset="0"/>
+              </a:rPr>
+              <a:t>.</a:t>
+            </a:r>
+            <a:r>
+              <a:rPr kumimoji="0" lang="en-US" altLang="en-US" sz="900" b="0" i="0" u="none" strike="noStrike" cap="none" normalizeH="0" baseline="0" dirty="0">
+                <a:ln>
+                  <a:noFill/>
+                </a:ln>
+                <a:solidFill>
+                  <a:srgbClr val="DCDCAA"/>
+                </a:solidFill>
+                <a:effectLst/>
+                <a:latin typeface="Fira Code" panose="020B0809050000020004" pitchFamily="49" charset="0"/>
+              </a:rPr>
+              <a:t>WriteLine</a:t>
+            </a:r>
+            <a:r>
+              <a:rPr kumimoji="0" lang="en-US" altLang="en-US" sz="900" b="0" i="0" u="none" strike="noStrike" cap="none" normalizeH="0" baseline="0" dirty="0">
+                <a:ln>
+                  <a:noFill/>
+                </a:ln>
+                <a:solidFill>
+                  <a:srgbClr val="DCDCDC"/>
+                </a:solidFill>
+                <a:effectLst/>
+                <a:latin typeface="Fira Code" panose="020B0809050000020004" pitchFamily="49" charset="0"/>
+              </a:rPr>
+              <a:t>(</a:t>
+            </a:r>
+            <a:r>
+              <a:rPr kumimoji="0" lang="en-US" altLang="en-US" sz="900" b="0" i="0" u="none" strike="noStrike" cap="none" normalizeH="0" baseline="0" dirty="0">
+                <a:ln>
+                  <a:noFill/>
+                </a:ln>
+                <a:solidFill>
+                  <a:srgbClr val="D69D85"/>
+                </a:solidFill>
+                <a:effectLst/>
+                <a:latin typeface="Fira Code" panose="020B0809050000020004" pitchFamily="49" charset="0"/>
+              </a:rPr>
+              <a:t>"&lt;= Invoking "</a:t>
+            </a:r>
+            <a:r>
+              <a:rPr kumimoji="0" lang="en-US" altLang="en-US" sz="900" b="0" i="0" u="none" strike="noStrike" cap="none" normalizeH="0" baseline="0" dirty="0">
+                <a:ln>
+                  <a:noFill/>
+                </a:ln>
+                <a:solidFill>
+                  <a:srgbClr val="DCDCDC"/>
+                </a:solidFill>
+                <a:effectLst/>
+                <a:latin typeface="Fira Code" panose="020B0809050000020004" pitchFamily="49" charset="0"/>
+              </a:rPr>
+              <a:t> </a:t>
+            </a:r>
+            <a:r>
+              <a:rPr kumimoji="0" lang="en-US" altLang="en-US" sz="900" b="0" i="0" u="none" strike="noStrike" cap="none" normalizeH="0" baseline="0" dirty="0">
+                <a:ln>
+                  <a:noFill/>
+                </a:ln>
+                <a:solidFill>
+                  <a:srgbClr val="B4B4B4"/>
+                </a:solidFill>
+                <a:effectLst/>
+                <a:latin typeface="Fira Code" panose="020B0809050000020004" pitchFamily="49" charset="0"/>
+              </a:rPr>
+              <a:t>+</a:t>
+            </a:r>
+            <a:r>
+              <a:rPr kumimoji="0" lang="en-US" altLang="en-US" sz="900" b="0" i="0" u="none" strike="noStrike" cap="none" normalizeH="0" baseline="0" dirty="0">
+                <a:ln>
+                  <a:noFill/>
+                </a:ln>
+                <a:solidFill>
+                  <a:srgbClr val="DCDCDC"/>
+                </a:solidFill>
+                <a:effectLst/>
+                <a:latin typeface="Fira Code" panose="020B0809050000020004" pitchFamily="49" charset="0"/>
+              </a:rPr>
+              <a:t> </a:t>
+            </a:r>
+            <a:r>
+              <a:rPr kumimoji="0" lang="en-US" altLang="en-US" sz="900" b="0" i="0" u="none" strike="noStrike" cap="none" normalizeH="0" baseline="0" dirty="0">
+                <a:ln>
+                  <a:noFill/>
+                </a:ln>
+                <a:solidFill>
+                  <a:srgbClr val="9CDCFE"/>
+                </a:solidFill>
+                <a:effectLst/>
+                <a:latin typeface="Fira Code" panose="020B0809050000020004" pitchFamily="49" charset="0"/>
+              </a:rPr>
+              <a:t>context</a:t>
+            </a:r>
+            <a:r>
+              <a:rPr kumimoji="0" lang="en-US" altLang="en-US" sz="900" b="0" i="0" u="none" strike="noStrike" cap="none" normalizeH="0" baseline="0" dirty="0">
+                <a:ln>
+                  <a:noFill/>
+                </a:ln>
+                <a:solidFill>
+                  <a:srgbClr val="B4B4B4"/>
+                </a:solidFill>
+                <a:effectLst/>
+                <a:latin typeface="Fira Code" panose="020B0809050000020004" pitchFamily="49" charset="0"/>
+              </a:rPr>
+              <a:t>.</a:t>
+            </a:r>
+            <a:r>
+              <a:rPr kumimoji="0" lang="en-US" altLang="en-US" sz="900" b="0" i="0" u="none" strike="noStrike" cap="none" normalizeH="0" baseline="0" dirty="0">
+                <a:ln>
+                  <a:noFill/>
+                </a:ln>
+                <a:solidFill>
+                  <a:srgbClr val="DCDCDC"/>
+                </a:solidFill>
+                <a:effectLst/>
+                <a:latin typeface="Fira Code" panose="020B0809050000020004" pitchFamily="49" charset="0"/>
+              </a:rPr>
+              <a:t>Invocation</a:t>
+            </a:r>
+            <a:r>
+              <a:rPr kumimoji="0" lang="en-US" altLang="en-US" sz="900" b="0" i="0" u="none" strike="noStrike" cap="none" normalizeH="0" baseline="0" dirty="0">
+                <a:ln>
+                  <a:noFill/>
+                </a:ln>
+                <a:solidFill>
+                  <a:srgbClr val="B4B4B4"/>
+                </a:solidFill>
+                <a:effectLst/>
+                <a:latin typeface="Fira Code" panose="020B0809050000020004" pitchFamily="49" charset="0"/>
+              </a:rPr>
+              <a:t>.</a:t>
+            </a:r>
+            <a:r>
+              <a:rPr kumimoji="0" lang="en-US" altLang="en-US" sz="900" b="0" i="0" u="none" strike="noStrike" cap="none" normalizeH="0" baseline="0" dirty="0">
+                <a:ln>
+                  <a:noFill/>
+                </a:ln>
+                <a:solidFill>
+                  <a:srgbClr val="DCDCDC"/>
+                </a:solidFill>
+                <a:effectLst/>
+                <a:latin typeface="Fira Code" panose="020B0809050000020004" pitchFamily="49" charset="0"/>
+              </a:rPr>
+              <a:t>Method </a:t>
+            </a:r>
+            <a:r>
+              <a:rPr kumimoji="0" lang="en-US" altLang="en-US" sz="900" b="0" i="0" u="none" strike="noStrike" cap="none" normalizeH="0" baseline="0" dirty="0">
+                <a:ln>
+                  <a:noFill/>
+                </a:ln>
+                <a:solidFill>
+                  <a:srgbClr val="B4B4B4"/>
+                </a:solidFill>
+                <a:effectLst/>
+                <a:latin typeface="Fira Code" panose="020B0809050000020004" pitchFamily="49" charset="0"/>
+              </a:rPr>
+              <a:t>+</a:t>
+            </a:r>
+            <a:r>
+              <a:rPr kumimoji="0" lang="en-US" altLang="en-US" sz="900" b="0" i="0" u="none" strike="noStrike" cap="none" normalizeH="0" baseline="0" dirty="0">
+                <a:ln>
+                  <a:noFill/>
+                </a:ln>
+                <a:solidFill>
+                  <a:srgbClr val="DCDCDC"/>
+                </a:solidFill>
+                <a:effectLst/>
+                <a:latin typeface="Fira Code" panose="020B0809050000020004" pitchFamily="49" charset="0"/>
+              </a:rPr>
+              <a:t> </a:t>
+            </a:r>
+            <a:r>
+              <a:rPr kumimoji="0" lang="en-US" altLang="en-US" sz="900" b="0" i="0" u="none" strike="noStrike" cap="none" normalizeH="0" baseline="0" dirty="0">
+                <a:ln>
+                  <a:noFill/>
+                </a:ln>
+                <a:solidFill>
+                  <a:srgbClr val="D69D85"/>
+                </a:solidFill>
+                <a:effectLst/>
+                <a:latin typeface="Fira Code" panose="020B0809050000020004" pitchFamily="49" charset="0"/>
+              </a:rPr>
+              <a:t>" on client hub "</a:t>
+            </a:r>
+            <a:r>
+              <a:rPr kumimoji="0" lang="en-US" altLang="en-US" sz="900" b="0" i="0" u="none" strike="noStrike" cap="none" normalizeH="0" baseline="0" dirty="0">
+                <a:ln>
+                  <a:noFill/>
+                </a:ln>
+                <a:solidFill>
+                  <a:srgbClr val="DCDCDC"/>
+                </a:solidFill>
+                <a:effectLst/>
+                <a:latin typeface="Fira Code" panose="020B0809050000020004" pitchFamily="49" charset="0"/>
+              </a:rPr>
+              <a:t> </a:t>
+            </a:r>
+            <a:r>
+              <a:rPr kumimoji="0" lang="en-US" altLang="en-US" sz="900" b="0" i="0" u="none" strike="noStrike" cap="none" normalizeH="0" baseline="0" dirty="0">
+                <a:ln>
+                  <a:noFill/>
+                </a:ln>
+                <a:solidFill>
+                  <a:srgbClr val="B4B4B4"/>
+                </a:solidFill>
+                <a:effectLst/>
+                <a:latin typeface="Fira Code" panose="020B0809050000020004" pitchFamily="49" charset="0"/>
+              </a:rPr>
+              <a:t>+</a:t>
+            </a:r>
+            <a:r>
+              <a:rPr kumimoji="0" lang="en-US" altLang="en-US" sz="900" b="0" i="0" u="none" strike="noStrike" cap="none" normalizeH="0" baseline="0" dirty="0">
+                <a:ln>
+                  <a:noFill/>
+                </a:ln>
+                <a:solidFill>
+                  <a:srgbClr val="DCDCDC"/>
+                </a:solidFill>
+                <a:effectLst/>
+                <a:latin typeface="Fira Code" panose="020B0809050000020004" pitchFamily="49" charset="0"/>
+              </a:rPr>
+              <a:t> </a:t>
+            </a:r>
+            <a:r>
+              <a:rPr kumimoji="0" lang="en-US" altLang="en-US" sz="900" b="0" i="0" u="none" strike="noStrike" cap="none" normalizeH="0" baseline="0" dirty="0">
+                <a:ln>
+                  <a:noFill/>
+                </a:ln>
+                <a:solidFill>
+                  <a:srgbClr val="9CDCFE"/>
+                </a:solidFill>
+                <a:effectLst/>
+                <a:latin typeface="Fira Code" panose="020B0809050000020004" pitchFamily="49" charset="0"/>
+              </a:rPr>
+              <a:t>context</a:t>
+            </a:r>
+            <a:r>
+              <a:rPr kumimoji="0" lang="en-US" altLang="en-US" sz="900" b="0" i="0" u="none" strike="noStrike" cap="none" normalizeH="0" baseline="0" dirty="0">
+                <a:ln>
+                  <a:noFill/>
+                </a:ln>
+                <a:solidFill>
+                  <a:srgbClr val="B4B4B4"/>
+                </a:solidFill>
+                <a:effectLst/>
+                <a:latin typeface="Fira Code" panose="020B0809050000020004" pitchFamily="49" charset="0"/>
+              </a:rPr>
+              <a:t>.</a:t>
+            </a:r>
+            <a:r>
+              <a:rPr kumimoji="0" lang="en-US" altLang="en-US" sz="900" b="0" i="0" u="none" strike="noStrike" cap="none" normalizeH="0" baseline="0" dirty="0">
+                <a:ln>
+                  <a:noFill/>
+                </a:ln>
+                <a:solidFill>
+                  <a:srgbClr val="DCDCDC"/>
+                </a:solidFill>
+                <a:effectLst/>
+                <a:latin typeface="Fira Code" panose="020B0809050000020004" pitchFamily="49" charset="0"/>
+              </a:rPr>
+              <a:t>Invocation</a:t>
+            </a:r>
+            <a:r>
+              <a:rPr kumimoji="0" lang="en-US" altLang="en-US" sz="900" b="0" i="0" u="none" strike="noStrike" cap="none" normalizeH="0" baseline="0" dirty="0">
+                <a:ln>
+                  <a:noFill/>
+                </a:ln>
+                <a:solidFill>
+                  <a:srgbClr val="B4B4B4"/>
+                </a:solidFill>
+                <a:effectLst/>
+                <a:latin typeface="Fira Code" panose="020B0809050000020004" pitchFamily="49" charset="0"/>
+              </a:rPr>
+              <a:t>.</a:t>
+            </a:r>
+            <a:r>
+              <a:rPr kumimoji="0" lang="en-US" altLang="en-US" sz="900" b="0" i="0" u="none" strike="noStrike" cap="none" normalizeH="0" baseline="0" dirty="0">
+                <a:ln>
+                  <a:noFill/>
+                </a:ln>
+                <a:solidFill>
+                  <a:srgbClr val="DCDCDC"/>
+                </a:solidFill>
+                <a:effectLst/>
+                <a:latin typeface="Fira Code" panose="020B0809050000020004" pitchFamily="49" charset="0"/>
+              </a:rPr>
+              <a:t>Hub);</a:t>
+            </a:r>
+          </a:p>
+          <a:p>
+            <a:pPr marL="0" marR="0" lvl="0" indent="0" algn="l" defTabSz="914400" rtl="0" eaLnBrk="0" fontAlgn="base" latinLnBrk="0" hangingPunct="0">
+              <a:lnSpc>
+                <a:spcPct val="100000"/>
+              </a:lnSpc>
+              <a:spcBef>
+                <a:spcPct val="0"/>
+              </a:spcBef>
+              <a:spcAft>
+                <a:spcPct val="0"/>
+              </a:spcAft>
+              <a:buClrTx/>
+              <a:buSzTx/>
+              <a:buFontTx/>
+              <a:buNone/>
+              <a:tabLst/>
+            </a:pPr>
+            <a:r>
+              <a:rPr kumimoji="0" lang="en-US" altLang="en-US" sz="900" b="0" i="0" u="none" strike="noStrike" cap="none" normalizeH="0" baseline="0" dirty="0">
+                <a:ln>
+                  <a:noFill/>
+                </a:ln>
+                <a:solidFill>
+                  <a:srgbClr val="DCDCDC"/>
+                </a:solidFill>
+                <a:effectLst/>
+                <a:latin typeface="Fira Code" panose="020B0809050000020004" pitchFamily="49" charset="0"/>
+              </a:rPr>
+              <a:t>         </a:t>
+            </a:r>
+            <a:r>
+              <a:rPr kumimoji="0" lang="en-US" altLang="en-US" sz="900" b="0" i="0" u="none" strike="noStrike" cap="none" normalizeH="0" baseline="0" dirty="0">
+                <a:ln>
+                  <a:noFill/>
+                </a:ln>
+                <a:solidFill>
+                  <a:srgbClr val="D8A0DF"/>
+                </a:solidFill>
+                <a:effectLst/>
+                <a:latin typeface="Fira Code" panose="020B0809050000020004" pitchFamily="49" charset="0"/>
+              </a:rPr>
+              <a:t>return</a:t>
+            </a:r>
+            <a:r>
+              <a:rPr kumimoji="0" lang="en-US" altLang="en-US" sz="900" b="0" i="0" u="none" strike="noStrike" cap="none" normalizeH="0" baseline="0" dirty="0">
+                <a:ln>
+                  <a:noFill/>
+                </a:ln>
+                <a:solidFill>
+                  <a:srgbClr val="DCDCDC"/>
+                </a:solidFill>
+                <a:effectLst/>
+                <a:latin typeface="Fira Code" panose="020B0809050000020004" pitchFamily="49" charset="0"/>
+              </a:rPr>
+              <a:t> </a:t>
+            </a:r>
+            <a:r>
+              <a:rPr kumimoji="0" lang="en-US" altLang="en-US" sz="900" b="0" i="0" u="none" strike="noStrike" cap="none" normalizeH="0" baseline="0" dirty="0">
+                <a:ln>
+                  <a:noFill/>
+                </a:ln>
+                <a:solidFill>
+                  <a:srgbClr val="569CD6"/>
+                </a:solidFill>
+                <a:effectLst/>
+                <a:latin typeface="Fira Code" panose="020B0809050000020004" pitchFamily="49" charset="0"/>
+              </a:rPr>
+              <a:t>base</a:t>
+            </a:r>
+            <a:r>
+              <a:rPr kumimoji="0" lang="en-US" altLang="en-US" sz="900" b="0" i="0" u="none" strike="noStrike" cap="none" normalizeH="0" baseline="0" dirty="0">
+                <a:ln>
+                  <a:noFill/>
+                </a:ln>
+                <a:solidFill>
+                  <a:srgbClr val="B4B4B4"/>
+                </a:solidFill>
+                <a:effectLst/>
+                <a:latin typeface="Fira Code" panose="020B0809050000020004" pitchFamily="49" charset="0"/>
+              </a:rPr>
+              <a:t>.</a:t>
+            </a:r>
+            <a:r>
+              <a:rPr kumimoji="0" lang="en-US" altLang="en-US" sz="900" b="0" i="0" u="none" strike="noStrike" cap="none" normalizeH="0" baseline="0" dirty="0">
+                <a:ln>
+                  <a:noFill/>
+                </a:ln>
+                <a:solidFill>
+                  <a:srgbClr val="DCDCAA"/>
+                </a:solidFill>
+                <a:effectLst/>
+                <a:latin typeface="Fira Code" panose="020B0809050000020004" pitchFamily="49" charset="0"/>
+              </a:rPr>
+              <a:t>OnBeforeOutgoing</a:t>
+            </a:r>
+            <a:r>
+              <a:rPr kumimoji="0" lang="en-US" altLang="en-US" sz="900" b="0" i="0" u="none" strike="noStrike" cap="none" normalizeH="0" baseline="0" dirty="0">
+                <a:ln>
+                  <a:noFill/>
+                </a:ln>
+                <a:solidFill>
+                  <a:srgbClr val="DCDCDC"/>
+                </a:solidFill>
+                <a:effectLst/>
+                <a:latin typeface="Fira Code" panose="020B0809050000020004" pitchFamily="49" charset="0"/>
+              </a:rPr>
+              <a:t>(</a:t>
+            </a:r>
+            <a:r>
+              <a:rPr kumimoji="0" lang="en-US" altLang="en-US" sz="900" b="0" i="0" u="none" strike="noStrike" cap="none" normalizeH="0" baseline="0" dirty="0">
+                <a:ln>
+                  <a:noFill/>
+                </a:ln>
+                <a:solidFill>
+                  <a:srgbClr val="9CDCFE"/>
+                </a:solidFill>
+                <a:effectLst/>
+                <a:latin typeface="Fira Code" panose="020B0809050000020004" pitchFamily="49" charset="0"/>
+              </a:rPr>
+              <a:t>context</a:t>
+            </a:r>
+            <a:r>
+              <a:rPr kumimoji="0" lang="en-US" altLang="en-US" sz="900" b="0" i="0" u="none" strike="noStrike" cap="none" normalizeH="0" baseline="0" dirty="0">
+                <a:ln>
+                  <a:noFill/>
+                </a:ln>
+                <a:solidFill>
+                  <a:srgbClr val="DCDCDC"/>
+                </a:solidFill>
+                <a:effectLst/>
+                <a:latin typeface="Fira Code" panose="020B0809050000020004" pitchFamily="49" charset="0"/>
+              </a:rPr>
+              <a:t>);</a:t>
+            </a:r>
+          </a:p>
+          <a:p>
+            <a:pPr marL="0" marR="0" lvl="0" indent="0" algn="l" defTabSz="914400" rtl="0" eaLnBrk="0" fontAlgn="base" latinLnBrk="0" hangingPunct="0">
+              <a:lnSpc>
+                <a:spcPct val="100000"/>
+              </a:lnSpc>
+              <a:spcBef>
+                <a:spcPct val="0"/>
+              </a:spcBef>
+              <a:spcAft>
+                <a:spcPct val="0"/>
+              </a:spcAft>
+              <a:buClrTx/>
+              <a:buSzTx/>
+              <a:buFontTx/>
+              <a:buNone/>
+              <a:tabLst/>
+            </a:pPr>
+            <a:r>
+              <a:rPr kumimoji="0" lang="en-US" altLang="en-US" sz="900" b="0" i="0" u="none" strike="noStrike" cap="none" normalizeH="0" baseline="0" dirty="0">
+                <a:ln>
+                  <a:noFill/>
+                </a:ln>
+                <a:solidFill>
+                  <a:srgbClr val="DCDCDC"/>
+                </a:solidFill>
+                <a:effectLst/>
+                <a:latin typeface="Fira Code" panose="020B0809050000020004" pitchFamily="49" charset="0"/>
+              </a:rPr>
+              <a:t>     }</a:t>
+            </a:r>
+          </a:p>
+          <a:p>
+            <a:pPr marL="0" marR="0" lvl="0" indent="0" algn="l" defTabSz="914400" rtl="0" eaLnBrk="0" fontAlgn="base" latinLnBrk="0" hangingPunct="0">
+              <a:lnSpc>
+                <a:spcPct val="100000"/>
+              </a:lnSpc>
+              <a:spcBef>
+                <a:spcPct val="0"/>
+              </a:spcBef>
+              <a:spcAft>
+                <a:spcPct val="0"/>
+              </a:spcAft>
+              <a:buClrTx/>
+              <a:buSzTx/>
+              <a:buFontTx/>
+              <a:buNone/>
+              <a:tabLst/>
+            </a:pPr>
+            <a:r>
+              <a:rPr kumimoji="0" lang="en-US" altLang="en-US" sz="900" b="0" i="0" u="none" strike="noStrike" cap="none" normalizeH="0" baseline="0" dirty="0">
+                <a:ln>
+                  <a:noFill/>
+                </a:ln>
+                <a:solidFill>
+                  <a:srgbClr val="DCDCDC"/>
+                </a:solidFill>
+                <a:effectLst/>
+                <a:latin typeface="Fira Code" panose="020B0809050000020004" pitchFamily="49" charset="0"/>
+              </a:rPr>
+              <a:t>}</a:t>
+            </a:r>
+            <a:endParaRPr kumimoji="0" lang="en-US" altLang="en-US" sz="1800" b="0" i="0" u="none" strike="noStrike" cap="none" normalizeH="0" baseline="0" dirty="0">
+              <a:ln>
+                <a:noFill/>
+              </a:ln>
+              <a:solidFill>
+                <a:schemeClr val="tx1"/>
+              </a:solidFill>
+              <a:effectLst/>
+              <a:latin typeface="Arial" panose="020B0604020202020204" pitchFamily="34" charset="0"/>
+            </a:endParaRPr>
+          </a:p>
+        </p:txBody>
+      </p:sp>
+      <p:sp>
+        <p:nvSpPr>
+          <p:cNvPr id="3" name="Rectangle 2">
+            <a:extLst>
+              <a:ext uri="{FF2B5EF4-FFF2-40B4-BE49-F238E27FC236}">
+                <a16:creationId xmlns:a16="http://schemas.microsoft.com/office/drawing/2014/main" id="{DFB16E55-D37B-481D-863A-B2A7DB89CE88}"/>
+              </a:ext>
+            </a:extLst>
+          </p:cNvPr>
+          <p:cNvSpPr>
+            <a:spLocks noChangeArrowheads="1"/>
+          </p:cNvSpPr>
+          <p:nvPr/>
+        </p:nvSpPr>
+        <p:spPr bwMode="auto">
+          <a:xfrm>
+            <a:off x="1063558" y="5265761"/>
+            <a:ext cx="9202723" cy="230832"/>
+          </a:xfrm>
+          <a:prstGeom prst="rect">
+            <a:avLst/>
+          </a:prstGeom>
+          <a:solidFill>
+            <a:srgbClr val="1E1E1E"/>
+          </a:solidFill>
+          <a:ln>
+            <a:noFill/>
+          </a:ln>
+          <a:effectLst/>
+          <a:extLst>
+            <a:ext uri="{91240B29-F687-4F45-9708-019B960494DF}">
+              <a14:hiddenLine xmlns:a14="http://schemas.microsoft.com/office/drawing/2010/main" w="9525">
+                <a:solidFill>
+                  <a:schemeClr val="tx1"/>
+                </a:solidFill>
+                <a:miter lim="800000"/>
+                <a:headEnd/>
+                <a:tailEnd/>
+              </a14:hiddenLine>
+            </a:ext>
+            <a:ext uri="{AF507438-7753-43E0-B8FC-AC1667EBCBE1}">
+              <a14:hiddenEffects xmlns:a14="http://schemas.microsoft.com/office/drawing/2010/main">
+                <a:effectLst>
+                  <a:outerShdw dist="35921" dir="2700000" algn="ctr" rotWithShape="0">
+                    <a:schemeClr val="bg2"/>
+                  </a:outerShdw>
+                </a:effectLst>
+              </a14:hiddenEffects>
+            </a:ext>
+          </a:extLst>
+        </p:spPr>
+        <p:txBody>
+          <a:bodyPr vert="horz" wrap="square" lIns="91440" tIns="45720" rIns="91440" bIns="45720" numCol="1" anchor="ctr" anchorCtr="0" compatLnSpc="1">
+            <a:prstTxWarp prst="textNoShape">
+              <a:avLst/>
+            </a:prstTxWarp>
+            <a:spAutoFit/>
+          </a:bodyPr>
+          <a:lstStyle/>
+          <a:p>
+            <a:pPr marL="0" marR="0" lvl="0" indent="0" algn="l" defTabSz="914400" rtl="0" eaLnBrk="0" fontAlgn="base" latinLnBrk="0" hangingPunct="0">
+              <a:lnSpc>
+                <a:spcPct val="100000"/>
+              </a:lnSpc>
+              <a:spcBef>
+                <a:spcPct val="0"/>
+              </a:spcBef>
+              <a:spcAft>
+                <a:spcPct val="0"/>
+              </a:spcAft>
+              <a:buClrTx/>
+              <a:buSzTx/>
+              <a:buFontTx/>
+              <a:buNone/>
+              <a:tabLst/>
+            </a:pPr>
+            <a:r>
+              <a:rPr kumimoji="0" lang="en-US" altLang="en-US" sz="900" b="0" i="0" u="none" strike="noStrike" cap="none" normalizeH="0" baseline="0">
+                <a:ln>
+                  <a:noFill/>
+                </a:ln>
+                <a:solidFill>
+                  <a:srgbClr val="4EC9B0"/>
+                </a:solidFill>
+                <a:effectLst/>
+                <a:latin typeface="Fira Code" panose="020B0809050000020004" pitchFamily="49" charset="0"/>
+              </a:rPr>
+              <a:t>GlobalHost</a:t>
+            </a:r>
+            <a:r>
+              <a:rPr kumimoji="0" lang="en-US" altLang="en-US" sz="900" b="0" i="0" u="none" strike="noStrike" cap="none" normalizeH="0" baseline="0">
+                <a:ln>
+                  <a:noFill/>
+                </a:ln>
+                <a:solidFill>
+                  <a:srgbClr val="B4B4B4"/>
+                </a:solidFill>
+                <a:effectLst/>
+                <a:latin typeface="Fira Code" panose="020B0809050000020004" pitchFamily="49" charset="0"/>
+              </a:rPr>
+              <a:t>.</a:t>
+            </a:r>
+            <a:r>
+              <a:rPr kumimoji="0" lang="en-US" altLang="en-US" sz="900" b="0" i="0" u="none" strike="noStrike" cap="none" normalizeH="0" baseline="0">
+                <a:ln>
+                  <a:noFill/>
+                </a:ln>
+                <a:solidFill>
+                  <a:srgbClr val="DCDCDC"/>
+                </a:solidFill>
+                <a:effectLst/>
+                <a:latin typeface="Fira Code" panose="020B0809050000020004" pitchFamily="49" charset="0"/>
+              </a:rPr>
+              <a:t>HubPipeline</a:t>
+            </a:r>
+            <a:r>
+              <a:rPr kumimoji="0" lang="en-US" altLang="en-US" sz="900" b="0" i="0" u="none" strike="noStrike" cap="none" normalizeH="0" baseline="0">
+                <a:ln>
+                  <a:noFill/>
+                </a:ln>
+                <a:solidFill>
+                  <a:srgbClr val="B4B4B4"/>
+                </a:solidFill>
+                <a:effectLst/>
+                <a:latin typeface="Fira Code" panose="020B0809050000020004" pitchFamily="49" charset="0"/>
+              </a:rPr>
+              <a:t>.</a:t>
+            </a:r>
+            <a:r>
+              <a:rPr kumimoji="0" lang="en-US" altLang="en-US" sz="900" b="0" i="0" u="none" strike="noStrike" cap="none" normalizeH="0" baseline="0">
+                <a:ln>
+                  <a:noFill/>
+                </a:ln>
+                <a:solidFill>
+                  <a:srgbClr val="DCDCAA"/>
+                </a:solidFill>
+                <a:effectLst/>
+                <a:latin typeface="Fira Code" panose="020B0809050000020004" pitchFamily="49" charset="0"/>
+              </a:rPr>
+              <a:t>AddModule</a:t>
+            </a:r>
+            <a:r>
+              <a:rPr kumimoji="0" lang="en-US" altLang="en-US" sz="900" b="0" i="0" u="none" strike="noStrike" cap="none" normalizeH="0" baseline="0">
+                <a:ln>
+                  <a:noFill/>
+                </a:ln>
+                <a:solidFill>
+                  <a:srgbClr val="DCDCDC"/>
+                </a:solidFill>
+                <a:effectLst/>
+                <a:latin typeface="Fira Code" panose="020B0809050000020004" pitchFamily="49" charset="0"/>
+              </a:rPr>
+              <a:t>(</a:t>
+            </a:r>
+            <a:r>
+              <a:rPr kumimoji="0" lang="en-US" altLang="en-US" sz="900" b="0" i="0" u="none" strike="noStrike" cap="none" normalizeH="0" baseline="0">
+                <a:ln>
+                  <a:noFill/>
+                </a:ln>
+                <a:solidFill>
+                  <a:srgbClr val="569CD6"/>
+                </a:solidFill>
+                <a:effectLst/>
+                <a:latin typeface="Fira Code" panose="020B0809050000020004" pitchFamily="49" charset="0"/>
+              </a:rPr>
+              <a:t>new</a:t>
+            </a:r>
+            <a:r>
+              <a:rPr kumimoji="0" lang="en-US" altLang="en-US" sz="900" b="0" i="0" u="none" strike="noStrike" cap="none" normalizeH="0" baseline="0">
+                <a:ln>
+                  <a:noFill/>
+                </a:ln>
+                <a:solidFill>
+                  <a:srgbClr val="DCDCDC"/>
+                </a:solidFill>
+                <a:effectLst/>
+                <a:latin typeface="Fira Code" panose="020B0809050000020004" pitchFamily="49" charset="0"/>
+              </a:rPr>
+              <a:t> </a:t>
+            </a:r>
+            <a:r>
+              <a:rPr kumimoji="0" lang="en-US" altLang="en-US" sz="900" b="0" i="0" u="none" strike="noStrike" cap="none" normalizeH="0" baseline="0">
+                <a:ln>
+                  <a:noFill/>
+                </a:ln>
+                <a:solidFill>
+                  <a:srgbClr val="4EC9B0"/>
+                </a:solidFill>
+                <a:effectLst/>
+                <a:latin typeface="Fira Code" panose="020B0809050000020004" pitchFamily="49" charset="0"/>
+              </a:rPr>
+              <a:t>LoggingPipelineModule</a:t>
+            </a:r>
+            <a:r>
+              <a:rPr kumimoji="0" lang="en-US" altLang="en-US" sz="900" b="0" i="0" u="none" strike="noStrike" cap="none" normalizeH="0" baseline="0">
+                <a:ln>
+                  <a:noFill/>
+                </a:ln>
+                <a:solidFill>
+                  <a:srgbClr val="DCDCDC"/>
+                </a:solidFill>
+                <a:effectLst/>
+                <a:latin typeface="Fira Code" panose="020B0809050000020004" pitchFamily="49" charset="0"/>
+              </a:rPr>
+              <a:t>()); </a:t>
+            </a:r>
+            <a:endParaRPr kumimoji="0" lang="en-US" altLang="en-US" sz="1800" b="0" i="0" u="none" strike="noStrike" cap="none" normalizeH="0" baseline="0">
+              <a:ln>
+                <a:noFill/>
+              </a:ln>
+              <a:solidFill>
+                <a:schemeClr val="tx1"/>
+              </a:solidFill>
+              <a:effectLst/>
+              <a:latin typeface="Arial" panose="020B0604020202020204" pitchFamily="34" charset="0"/>
+            </a:endParaRPr>
+          </a:p>
+        </p:txBody>
+      </p:sp>
+    </p:spTree>
+    <p:extLst>
+      <p:ext uri="{BB962C8B-B14F-4D97-AF65-F5344CB8AC3E}">
+        <p14:creationId xmlns:p14="http://schemas.microsoft.com/office/powerpoint/2010/main" val="1152562539"/>
+      </p:ext>
+    </p:extLst>
+  </p:cSld>
+  <p:clrMapOvr>
+    <a:masterClrMapping/>
+  </p:clrMapOvr>
+</p:sld>
+</file>
+
+<file path=ppt/slides/slide35.xml><?xml version="1.0" encoding="utf-8"?>
+<p:sld xmlns:a="http://schemas.openxmlformats.org/drawingml/2006/main" xmlns:r="http://schemas.openxmlformats.org/officeDocument/2006/relationships" xmlns:p="http://schemas.openxmlformats.org/presentationml/2006/main">
+  <p:cSld>
+    <p:spTree>
+      <p:nvGrpSpPr>
+        <p:cNvPr id="1" name=""/>
+        <p:cNvGrpSpPr/>
+        <p:nvPr/>
+      </p:nvGrpSpPr>
+      <p:grpSpPr>
+        <a:xfrm>
+          <a:off x="0" y="0"/>
+          <a:ext cx="0" cy="0"/>
+          <a:chOff x="0" y="0"/>
+          <a:chExt cx="0" cy="0"/>
+        </a:xfrm>
+      </p:grpSpPr>
+      <p:sp>
+        <p:nvSpPr>
+          <p:cNvPr id="7" name="Title 6">
+            <a:extLst>
+              <a:ext uri="{FF2B5EF4-FFF2-40B4-BE49-F238E27FC236}">
+                <a16:creationId xmlns:a16="http://schemas.microsoft.com/office/drawing/2014/main" id="{995CDE5A-4025-488F-9F23-4B1873D72739}"/>
+              </a:ext>
+            </a:extLst>
+          </p:cNvPr>
+          <p:cNvSpPr>
+            <a:spLocks noGrp="1"/>
+          </p:cNvSpPr>
+          <p:nvPr>
+            <p:ph type="title"/>
+          </p:nvPr>
+        </p:nvSpPr>
+        <p:spPr>
+          <a:xfrm>
+            <a:off x="684211" y="755008"/>
+            <a:ext cx="10823576" cy="696287"/>
+          </a:xfrm>
+        </p:spPr>
+        <p:txBody>
+          <a:bodyPr anchor="t">
+            <a:normAutofit/>
+          </a:bodyPr>
+          <a:lstStyle/>
+          <a:p>
+            <a:r>
+              <a:rPr lang="en-US" cap="none" dirty="0">
+                <a:latin typeface="Segoe UI" panose="020B0502040204020203" pitchFamily="34" charset="0"/>
+                <a:cs typeface="Segoe UI" panose="020B0502040204020203" pitchFamily="34" charset="0"/>
+              </a:rPr>
               <a:t>Description</a:t>
             </a:r>
             <a:endParaRPr lang="en-ZA" cap="none" dirty="0">

</xml_diff>